<commit_message>
Update full likelihood figure
</commit_message>
<xml_diff>
--- a/docs/what_combine_does/CombineLikelihoodEqns.pptx
+++ b/docs/what_combine_does/CombineLikelihoodEqns.pptx
@@ -43,7 +43,7 @@
         <p:txBody>
           <a:bodyPr/>
           <a:p>
-            <a:fld id="{910B176F-2D2A-4AB5-9AAE-BA78209492D4}" type="slidenum">
+            <a:fld id="{6173F107-8F15-4856-8F29-1FE853F21DE1}" type="slidenum">
               <a:t>&lt;#&gt;</a:t>
             </a:fld>
           </a:p>
@@ -84,7 +84,7 @@
         <p:spPr>
           <a:xfrm>
             <a:off x="1777680" y="2298600"/>
-            <a:ext cx="20827800" cy="4647960"/>
+            <a:ext cx="20827440" cy="4647600"/>
           </a:xfrm>
           <a:prstGeom prst="rect">
             <a:avLst/>
@@ -102,11 +102,11 @@
             <a:pPr indent="0" algn="ctr">
               <a:buNone/>
             </a:pPr>
-            <a:endParaRPr b="0" lang="en-US" sz="3000" spc="-1" strike="noStrike">
-              <a:solidFill>
-                <a:srgbClr val="000000"/>
-              </a:solidFill>
-              <a:latin typeface="Helvetica Neue"/>
+            <a:endParaRPr b="0" lang="en-US" sz="4400" spc="-1" strike="noStrike">
+              <a:solidFill>
+                <a:srgbClr val="000000"/>
+              </a:solidFill>
+              <a:latin typeface="arial"/>
             </a:endParaRPr>
           </a:p>
         </p:txBody>
@@ -123,8 +123,8 @@
         </p:nvSpPr>
         <p:spPr>
           <a:xfrm>
-            <a:off x="1777680" y="7074000"/>
-            <a:ext cx="20827800" cy="757080"/>
+            <a:off x="1218960" y="3209400"/>
+            <a:ext cx="21944880" cy="3794400"/>
           </a:xfrm>
           <a:prstGeom prst="rect">
             <a:avLst/>
@@ -145,11 +145,11 @@
               </a:spcBef>
               <a:buNone/>
             </a:pPr>
-            <a:endParaRPr b="0" lang="en-US" sz="5200" spc="-1" strike="noStrike">
-              <a:solidFill>
-                <a:srgbClr val="000000"/>
-              </a:solidFill>
-              <a:latin typeface="Helvetica Neue"/>
+            <a:endParaRPr b="0" lang="en-US" sz="3200" spc="-1" strike="noStrike">
+              <a:solidFill>
+                <a:srgbClr val="000000"/>
+              </a:solidFill>
+              <a:latin typeface="arial"/>
             </a:endParaRPr>
           </a:p>
         </p:txBody>
@@ -166,8 +166,8 @@
         </p:nvSpPr>
         <p:spPr>
           <a:xfrm>
-            <a:off x="1777680" y="7903440"/>
-            <a:ext cx="20827800" cy="757080"/>
+            <a:off x="1218960" y="7364520"/>
+            <a:ext cx="21944880" cy="3794400"/>
           </a:xfrm>
           <a:prstGeom prst="rect">
             <a:avLst/>
@@ -188,11 +188,11 @@
               </a:spcBef>
               <a:buNone/>
             </a:pPr>
-            <a:endParaRPr b="0" lang="en-US" sz="5200" spc="-1" strike="noStrike">
-              <a:solidFill>
-                <a:srgbClr val="000000"/>
-              </a:solidFill>
-              <a:latin typeface="Helvetica Neue"/>
+            <a:endParaRPr b="0" lang="en-US" sz="3200" spc="-1" strike="noStrike">
+              <a:solidFill>
+                <a:srgbClr val="000000"/>
+              </a:solidFill>
+              <a:latin typeface="arial"/>
             </a:endParaRPr>
           </a:p>
         </p:txBody>
@@ -211,7 +211,7 @@
         <p:txBody>
           <a:bodyPr/>
           <a:p>
-            <a:fld id="{DF433084-51B7-4B2C-BC86-3E5E184675AF}" type="slidenum">
+            <a:fld id="{5B6B4F63-E7B6-47CF-BF8D-5B587511F8BB}" type="slidenum">
               <a:t>&lt;#&gt;</a:t>
             </a:fld>
           </a:p>
@@ -252,7 +252,7 @@
         <p:spPr>
           <a:xfrm>
             <a:off x="1777680" y="2298600"/>
-            <a:ext cx="20827800" cy="4647960"/>
+            <a:ext cx="20827440" cy="4647600"/>
           </a:xfrm>
           <a:prstGeom prst="rect">
             <a:avLst/>
@@ -270,11 +270,11 @@
             <a:pPr indent="0" algn="ctr">
               <a:buNone/>
             </a:pPr>
-            <a:endParaRPr b="0" lang="en-US" sz="3000" spc="-1" strike="noStrike">
-              <a:solidFill>
-                <a:srgbClr val="000000"/>
-              </a:solidFill>
-              <a:latin typeface="Helvetica Neue"/>
+            <a:endParaRPr b="0" lang="en-US" sz="4400" spc="-1" strike="noStrike">
+              <a:solidFill>
+                <a:srgbClr val="000000"/>
+              </a:solidFill>
+              <a:latin typeface="arial"/>
             </a:endParaRPr>
           </a:p>
         </p:txBody>
@@ -291,8 +291,8 @@
         </p:nvSpPr>
         <p:spPr>
           <a:xfrm>
-            <a:off x="1777680" y="7074000"/>
-            <a:ext cx="10163880" cy="757080"/>
+            <a:off x="1218960" y="3209400"/>
+            <a:ext cx="10708920" cy="3794400"/>
           </a:xfrm>
           <a:prstGeom prst="rect">
             <a:avLst/>
@@ -313,11 +313,11 @@
               </a:spcBef>
               <a:buNone/>
             </a:pPr>
-            <a:endParaRPr b="0" lang="en-US" sz="5200" spc="-1" strike="noStrike">
-              <a:solidFill>
-                <a:srgbClr val="000000"/>
-              </a:solidFill>
-              <a:latin typeface="Helvetica Neue"/>
+            <a:endParaRPr b="0" lang="en-US" sz="3200" spc="-1" strike="noStrike">
+              <a:solidFill>
+                <a:srgbClr val="000000"/>
+              </a:solidFill>
+              <a:latin typeface="arial"/>
             </a:endParaRPr>
           </a:p>
         </p:txBody>
@@ -334,8 +334,8 @@
         </p:nvSpPr>
         <p:spPr>
           <a:xfrm>
-            <a:off x="12450240" y="7074000"/>
-            <a:ext cx="10163880" cy="757080"/>
+            <a:off x="12463560" y="3209400"/>
+            <a:ext cx="10708920" cy="3794400"/>
           </a:xfrm>
           <a:prstGeom prst="rect">
             <a:avLst/>
@@ -356,11 +356,11 @@
               </a:spcBef>
               <a:buNone/>
             </a:pPr>
-            <a:endParaRPr b="0" lang="en-US" sz="5200" spc="-1" strike="noStrike">
-              <a:solidFill>
-                <a:srgbClr val="000000"/>
-              </a:solidFill>
-              <a:latin typeface="Helvetica Neue"/>
+            <a:endParaRPr b="0" lang="en-US" sz="3200" spc="-1" strike="noStrike">
+              <a:solidFill>
+                <a:srgbClr val="000000"/>
+              </a:solidFill>
+              <a:latin typeface="arial"/>
             </a:endParaRPr>
           </a:p>
         </p:txBody>
@@ -377,8 +377,8 @@
         </p:nvSpPr>
         <p:spPr>
           <a:xfrm>
-            <a:off x="1777680" y="7903440"/>
-            <a:ext cx="10163880" cy="757080"/>
+            <a:off x="1218960" y="7364520"/>
+            <a:ext cx="10708920" cy="3794400"/>
           </a:xfrm>
           <a:prstGeom prst="rect">
             <a:avLst/>
@@ -399,11 +399,11 @@
               </a:spcBef>
               <a:buNone/>
             </a:pPr>
-            <a:endParaRPr b="0" lang="en-US" sz="5200" spc="-1" strike="noStrike">
-              <a:solidFill>
-                <a:srgbClr val="000000"/>
-              </a:solidFill>
-              <a:latin typeface="Helvetica Neue"/>
+            <a:endParaRPr b="0" lang="en-US" sz="3200" spc="-1" strike="noStrike">
+              <a:solidFill>
+                <a:srgbClr val="000000"/>
+              </a:solidFill>
+              <a:latin typeface="arial"/>
             </a:endParaRPr>
           </a:p>
         </p:txBody>
@@ -420,8 +420,8 @@
         </p:nvSpPr>
         <p:spPr>
           <a:xfrm>
-            <a:off x="12450240" y="7903440"/>
-            <a:ext cx="10163880" cy="757080"/>
+            <a:off x="12463560" y="7364520"/>
+            <a:ext cx="10708920" cy="3794400"/>
           </a:xfrm>
           <a:prstGeom prst="rect">
             <a:avLst/>
@@ -442,11 +442,11 @@
               </a:spcBef>
               <a:buNone/>
             </a:pPr>
-            <a:endParaRPr b="0" lang="en-US" sz="5200" spc="-1" strike="noStrike">
-              <a:solidFill>
-                <a:srgbClr val="000000"/>
-              </a:solidFill>
-              <a:latin typeface="Helvetica Neue"/>
+            <a:endParaRPr b="0" lang="en-US" sz="3200" spc="-1" strike="noStrike">
+              <a:solidFill>
+                <a:srgbClr val="000000"/>
+              </a:solidFill>
+              <a:latin typeface="arial"/>
             </a:endParaRPr>
           </a:p>
         </p:txBody>
@@ -465,7 +465,7 @@
         <p:txBody>
           <a:bodyPr/>
           <a:p>
-            <a:fld id="{70D429EA-D7E7-462E-B547-40B7FA1DEDA5}" type="slidenum">
+            <a:fld id="{E402B150-4AB1-470A-BAD7-6F1D1EAE278E}" type="slidenum">
               <a:t>&lt;#&gt;</a:t>
             </a:fld>
           </a:p>
@@ -506,7 +506,7 @@
         <p:spPr>
           <a:xfrm>
             <a:off x="1777680" y="2298600"/>
-            <a:ext cx="20827800" cy="4647960"/>
+            <a:ext cx="20827440" cy="4647600"/>
           </a:xfrm>
           <a:prstGeom prst="rect">
             <a:avLst/>
@@ -524,11 +524,11 @@
             <a:pPr indent="0" algn="ctr">
               <a:buNone/>
             </a:pPr>
-            <a:endParaRPr b="0" lang="en-US" sz="3000" spc="-1" strike="noStrike">
-              <a:solidFill>
-                <a:srgbClr val="000000"/>
-              </a:solidFill>
-              <a:latin typeface="Helvetica Neue"/>
+            <a:endParaRPr b="0" lang="en-US" sz="4400" spc="-1" strike="noStrike">
+              <a:solidFill>
+                <a:srgbClr val="000000"/>
+              </a:solidFill>
+              <a:latin typeface="arial"/>
             </a:endParaRPr>
           </a:p>
         </p:txBody>
@@ -545,8 +545,8 @@
         </p:nvSpPr>
         <p:spPr>
           <a:xfrm>
-            <a:off x="1777680" y="7074000"/>
-            <a:ext cx="6706440" cy="757080"/>
+            <a:off x="1218960" y="3209400"/>
+            <a:ext cx="7066080" cy="3794400"/>
           </a:xfrm>
           <a:prstGeom prst="rect">
             <a:avLst/>
@@ -567,11 +567,11 @@
               </a:spcBef>
               <a:buNone/>
             </a:pPr>
-            <a:endParaRPr b="0" lang="en-US" sz="5200" spc="-1" strike="noStrike">
-              <a:solidFill>
-                <a:srgbClr val="000000"/>
-              </a:solidFill>
-              <a:latin typeface="Helvetica Neue"/>
+            <a:endParaRPr b="0" lang="en-US" sz="3200" spc="-1" strike="noStrike">
+              <a:solidFill>
+                <a:srgbClr val="000000"/>
+              </a:solidFill>
+              <a:latin typeface="arial"/>
             </a:endParaRPr>
           </a:p>
         </p:txBody>
@@ -588,8 +588,8 @@
         </p:nvSpPr>
         <p:spPr>
           <a:xfrm>
-            <a:off x="8820000" y="7074000"/>
-            <a:ext cx="6706440" cy="757080"/>
+            <a:off x="8638560" y="3209400"/>
+            <a:ext cx="7066080" cy="3794400"/>
           </a:xfrm>
           <a:prstGeom prst="rect">
             <a:avLst/>
@@ -610,11 +610,11 @@
               </a:spcBef>
               <a:buNone/>
             </a:pPr>
-            <a:endParaRPr b="0" lang="en-US" sz="5200" spc="-1" strike="noStrike">
-              <a:solidFill>
-                <a:srgbClr val="000000"/>
-              </a:solidFill>
-              <a:latin typeface="Helvetica Neue"/>
+            <a:endParaRPr b="0" lang="en-US" sz="3200" spc="-1" strike="noStrike">
+              <a:solidFill>
+                <a:srgbClr val="000000"/>
+              </a:solidFill>
+              <a:latin typeface="arial"/>
             </a:endParaRPr>
           </a:p>
         </p:txBody>
@@ -631,8 +631,8 @@
         </p:nvSpPr>
         <p:spPr>
           <a:xfrm>
-            <a:off x="15861960" y="7074000"/>
-            <a:ext cx="6706440" cy="757080"/>
+            <a:off x="16058520" y="3209400"/>
+            <a:ext cx="7066080" cy="3794400"/>
           </a:xfrm>
           <a:prstGeom prst="rect">
             <a:avLst/>
@@ -653,11 +653,11 @@
               </a:spcBef>
               <a:buNone/>
             </a:pPr>
-            <a:endParaRPr b="0" lang="en-US" sz="5200" spc="-1" strike="noStrike">
-              <a:solidFill>
-                <a:srgbClr val="000000"/>
-              </a:solidFill>
-              <a:latin typeface="Helvetica Neue"/>
+            <a:endParaRPr b="0" lang="en-US" sz="3200" spc="-1" strike="noStrike">
+              <a:solidFill>
+                <a:srgbClr val="000000"/>
+              </a:solidFill>
+              <a:latin typeface="arial"/>
             </a:endParaRPr>
           </a:p>
         </p:txBody>
@@ -674,8 +674,8 @@
         </p:nvSpPr>
         <p:spPr>
           <a:xfrm>
-            <a:off x="1777680" y="7903440"/>
-            <a:ext cx="6706440" cy="757080"/>
+            <a:off x="1218960" y="7364520"/>
+            <a:ext cx="7066080" cy="3794400"/>
           </a:xfrm>
           <a:prstGeom prst="rect">
             <a:avLst/>
@@ -696,11 +696,11 @@
               </a:spcBef>
               <a:buNone/>
             </a:pPr>
-            <a:endParaRPr b="0" lang="en-US" sz="5200" spc="-1" strike="noStrike">
-              <a:solidFill>
-                <a:srgbClr val="000000"/>
-              </a:solidFill>
-              <a:latin typeface="Helvetica Neue"/>
+            <a:endParaRPr b="0" lang="en-US" sz="3200" spc="-1" strike="noStrike">
+              <a:solidFill>
+                <a:srgbClr val="000000"/>
+              </a:solidFill>
+              <a:latin typeface="arial"/>
             </a:endParaRPr>
           </a:p>
         </p:txBody>
@@ -717,8 +717,8 @@
         </p:nvSpPr>
         <p:spPr>
           <a:xfrm>
-            <a:off x="8820000" y="7903440"/>
-            <a:ext cx="6706440" cy="757080"/>
+            <a:off x="8638560" y="7364520"/>
+            <a:ext cx="7066080" cy="3794400"/>
           </a:xfrm>
           <a:prstGeom prst="rect">
             <a:avLst/>
@@ -739,11 +739,11 @@
               </a:spcBef>
               <a:buNone/>
             </a:pPr>
-            <a:endParaRPr b="0" lang="en-US" sz="5200" spc="-1" strike="noStrike">
-              <a:solidFill>
-                <a:srgbClr val="000000"/>
-              </a:solidFill>
-              <a:latin typeface="Helvetica Neue"/>
+            <a:endParaRPr b="0" lang="en-US" sz="3200" spc="-1" strike="noStrike">
+              <a:solidFill>
+                <a:srgbClr val="000000"/>
+              </a:solidFill>
+              <a:latin typeface="arial"/>
             </a:endParaRPr>
           </a:p>
         </p:txBody>
@@ -760,8 +760,8 @@
         </p:nvSpPr>
         <p:spPr>
           <a:xfrm>
-            <a:off x="15861960" y="7903440"/>
-            <a:ext cx="6706440" cy="757080"/>
+            <a:off x="16058520" y="7364520"/>
+            <a:ext cx="7066080" cy="3794400"/>
           </a:xfrm>
           <a:prstGeom prst="rect">
             <a:avLst/>
@@ -782,11 +782,11 @@
               </a:spcBef>
               <a:buNone/>
             </a:pPr>
-            <a:endParaRPr b="0" lang="en-US" sz="5200" spc="-1" strike="noStrike">
-              <a:solidFill>
-                <a:srgbClr val="000000"/>
-              </a:solidFill>
-              <a:latin typeface="Helvetica Neue"/>
+            <a:endParaRPr b="0" lang="en-US" sz="3200" spc="-1" strike="noStrike">
+              <a:solidFill>
+                <a:srgbClr val="000000"/>
+              </a:solidFill>
+              <a:latin typeface="arial"/>
             </a:endParaRPr>
           </a:p>
         </p:txBody>
@@ -805,7 +805,7 @@
         <p:txBody>
           <a:bodyPr/>
           <a:p>
-            <a:fld id="{5E1045AB-32AB-4A4B-B124-7E977F770145}" type="slidenum">
+            <a:fld id="{15F0DE30-D38D-4F40-BFE8-E66E46417E9B}" type="slidenum">
               <a:t>&lt;#&gt;</a:t>
             </a:fld>
           </a:p>
@@ -846,7 +846,7 @@
         <p:spPr>
           <a:xfrm>
             <a:off x="1777680" y="2298600"/>
-            <a:ext cx="20827800" cy="4647960"/>
+            <a:ext cx="20827440" cy="4647600"/>
           </a:xfrm>
           <a:prstGeom prst="rect">
             <a:avLst/>
@@ -864,11 +864,11 @@
             <a:pPr indent="0" algn="ctr">
               <a:buNone/>
             </a:pPr>
-            <a:endParaRPr b="0" lang="en-US" sz="3000" spc="-1" strike="noStrike">
-              <a:solidFill>
-                <a:srgbClr val="000000"/>
-              </a:solidFill>
-              <a:latin typeface="Helvetica Neue"/>
+            <a:endParaRPr b="0" lang="en-US" sz="4400" spc="-1" strike="noStrike">
+              <a:solidFill>
+                <a:srgbClr val="000000"/>
+              </a:solidFill>
+              <a:latin typeface="arial"/>
             </a:endParaRPr>
           </a:p>
         </p:txBody>
@@ -885,8 +885,8 @@
         </p:nvSpPr>
         <p:spPr>
           <a:xfrm>
-            <a:off x="1777680" y="7074000"/>
-            <a:ext cx="20827800" cy="1587240"/>
+            <a:off x="1218960" y="3209400"/>
+            <a:ext cx="21944880" cy="7954920"/>
           </a:xfrm>
           <a:prstGeom prst="rect">
             <a:avLst/>
@@ -927,7 +927,7 @@
         <p:txBody>
           <a:bodyPr/>
           <a:p>
-            <a:fld id="{4CCF919C-7FA7-4D4D-8956-438150F2FD15}" type="slidenum">
+            <a:fld id="{5270902E-1F5B-4ED4-BF57-850DAD9B9399}" type="slidenum">
               <a:t>&lt;#&gt;</a:t>
             </a:fld>
           </a:p>
@@ -968,7 +968,7 @@
         <p:spPr>
           <a:xfrm>
             <a:off x="1777680" y="2298600"/>
-            <a:ext cx="20827800" cy="4647960"/>
+            <a:ext cx="20827440" cy="4647600"/>
           </a:xfrm>
           <a:prstGeom prst="rect">
             <a:avLst/>
@@ -986,11 +986,11 @@
             <a:pPr indent="0" algn="ctr">
               <a:buNone/>
             </a:pPr>
-            <a:endParaRPr b="0" lang="en-US" sz="3000" spc="-1" strike="noStrike">
-              <a:solidFill>
-                <a:srgbClr val="000000"/>
-              </a:solidFill>
-              <a:latin typeface="Helvetica Neue"/>
+            <a:endParaRPr b="0" lang="en-US" sz="4400" spc="-1" strike="noStrike">
+              <a:solidFill>
+                <a:srgbClr val="000000"/>
+              </a:solidFill>
+              <a:latin typeface="arial"/>
             </a:endParaRPr>
           </a:p>
         </p:txBody>
@@ -1007,8 +1007,8 @@
         </p:nvSpPr>
         <p:spPr>
           <a:xfrm>
-            <a:off x="1777680" y="7074000"/>
-            <a:ext cx="20827800" cy="1587240"/>
+            <a:off x="1218960" y="3209400"/>
+            <a:ext cx="21944880" cy="7954920"/>
           </a:xfrm>
           <a:prstGeom prst="rect">
             <a:avLst/>
@@ -1029,11 +1029,11 @@
               </a:spcBef>
               <a:buNone/>
             </a:pPr>
-            <a:endParaRPr b="0" lang="en-US" sz="5200" spc="-1" strike="noStrike">
-              <a:solidFill>
-                <a:srgbClr val="000000"/>
-              </a:solidFill>
-              <a:latin typeface="Helvetica Neue"/>
+            <a:endParaRPr b="0" lang="en-US" sz="3200" spc="-1" strike="noStrike">
+              <a:solidFill>
+                <a:srgbClr val="000000"/>
+              </a:solidFill>
+              <a:latin typeface="arial"/>
             </a:endParaRPr>
           </a:p>
         </p:txBody>
@@ -1052,7 +1052,7 @@
         <p:txBody>
           <a:bodyPr/>
           <a:p>
-            <a:fld id="{888C2A57-38AA-47F8-A8DF-CC47BD16691E}" type="slidenum">
+            <a:fld id="{5E8F1E75-1C5F-47B3-87EF-EF55EF273BA0}" type="slidenum">
               <a:t>&lt;#&gt;</a:t>
             </a:fld>
           </a:p>
@@ -1093,7 +1093,7 @@
         <p:spPr>
           <a:xfrm>
             <a:off x="1777680" y="2298600"/>
-            <a:ext cx="20827800" cy="4647960"/>
+            <a:ext cx="20827440" cy="4647600"/>
           </a:xfrm>
           <a:prstGeom prst="rect">
             <a:avLst/>
@@ -1111,11 +1111,11 @@
             <a:pPr indent="0" algn="ctr">
               <a:buNone/>
             </a:pPr>
-            <a:endParaRPr b="0" lang="en-US" sz="3000" spc="-1" strike="noStrike">
-              <a:solidFill>
-                <a:srgbClr val="000000"/>
-              </a:solidFill>
-              <a:latin typeface="Helvetica Neue"/>
+            <a:endParaRPr b="0" lang="en-US" sz="4400" spc="-1" strike="noStrike">
+              <a:solidFill>
+                <a:srgbClr val="000000"/>
+              </a:solidFill>
+              <a:latin typeface="arial"/>
             </a:endParaRPr>
           </a:p>
         </p:txBody>
@@ -1132,8 +1132,8 @@
         </p:nvSpPr>
         <p:spPr>
           <a:xfrm>
-            <a:off x="1777680" y="7074000"/>
-            <a:ext cx="10163880" cy="1587240"/>
+            <a:off x="1218960" y="3209400"/>
+            <a:ext cx="10708920" cy="7954920"/>
           </a:xfrm>
           <a:prstGeom prst="rect">
             <a:avLst/>
@@ -1154,11 +1154,11 @@
               </a:spcBef>
               <a:buNone/>
             </a:pPr>
-            <a:endParaRPr b="0" lang="en-US" sz="5200" spc="-1" strike="noStrike">
-              <a:solidFill>
-                <a:srgbClr val="000000"/>
-              </a:solidFill>
-              <a:latin typeface="Helvetica Neue"/>
+            <a:endParaRPr b="0" lang="en-US" sz="3200" spc="-1" strike="noStrike">
+              <a:solidFill>
+                <a:srgbClr val="000000"/>
+              </a:solidFill>
+              <a:latin typeface="arial"/>
             </a:endParaRPr>
           </a:p>
         </p:txBody>
@@ -1175,8 +1175,8 @@
         </p:nvSpPr>
         <p:spPr>
           <a:xfrm>
-            <a:off x="12450240" y="7074000"/>
-            <a:ext cx="10163880" cy="1587240"/>
+            <a:off x="12463560" y="3209400"/>
+            <a:ext cx="10708920" cy="7954920"/>
           </a:xfrm>
           <a:prstGeom prst="rect">
             <a:avLst/>
@@ -1197,11 +1197,11 @@
               </a:spcBef>
               <a:buNone/>
             </a:pPr>
-            <a:endParaRPr b="0" lang="en-US" sz="5200" spc="-1" strike="noStrike">
-              <a:solidFill>
-                <a:srgbClr val="000000"/>
-              </a:solidFill>
-              <a:latin typeface="Helvetica Neue"/>
+            <a:endParaRPr b="0" lang="en-US" sz="3200" spc="-1" strike="noStrike">
+              <a:solidFill>
+                <a:srgbClr val="000000"/>
+              </a:solidFill>
+              <a:latin typeface="arial"/>
             </a:endParaRPr>
           </a:p>
         </p:txBody>
@@ -1220,7 +1220,7 @@
         <p:txBody>
           <a:bodyPr/>
           <a:p>
-            <a:fld id="{E19DE425-67DE-46FB-B622-9E96B51EB42D}" type="slidenum">
+            <a:fld id="{E69B1AE6-E69B-4990-B625-C32500553586}" type="slidenum">
               <a:t>&lt;#&gt;</a:t>
             </a:fld>
           </a:p>
@@ -1261,7 +1261,7 @@
         <p:spPr>
           <a:xfrm>
             <a:off x="1777680" y="2298600"/>
-            <a:ext cx="20827800" cy="4647960"/>
+            <a:ext cx="20827440" cy="4647600"/>
           </a:xfrm>
           <a:prstGeom prst="rect">
             <a:avLst/>
@@ -1279,11 +1279,11 @@
             <a:pPr indent="0" algn="ctr">
               <a:buNone/>
             </a:pPr>
-            <a:endParaRPr b="0" lang="en-US" sz="3000" spc="-1" strike="noStrike">
-              <a:solidFill>
-                <a:srgbClr val="000000"/>
-              </a:solidFill>
-              <a:latin typeface="Helvetica Neue"/>
+            <a:endParaRPr b="0" lang="en-US" sz="4400" spc="-1" strike="noStrike">
+              <a:solidFill>
+                <a:srgbClr val="000000"/>
+              </a:solidFill>
+              <a:latin typeface="arial"/>
             </a:endParaRPr>
           </a:p>
         </p:txBody>
@@ -1302,7 +1302,7 @@
         <p:txBody>
           <a:bodyPr/>
           <a:p>
-            <a:fld id="{33DE6EBE-296D-4305-BD9E-A75A1BC38CE1}" type="slidenum">
+            <a:fld id="{83304B04-B042-4D73-8E2C-EA15938AD14F}" type="slidenum">
               <a:t>&lt;#&gt;</a:t>
             </a:fld>
           </a:p>
@@ -1343,7 +1343,7 @@
         <p:spPr>
           <a:xfrm>
             <a:off x="1777680" y="2298600"/>
-            <a:ext cx="20827800" cy="21546360"/>
+            <a:ext cx="20827440" cy="21544920"/>
           </a:xfrm>
           <a:prstGeom prst="rect">
             <a:avLst/>
@@ -1382,7 +1382,7 @@
         <p:txBody>
           <a:bodyPr/>
           <a:p>
-            <a:fld id="{2E465A07-51F5-46DF-A2E6-6D2A900A03D7}" type="slidenum">
+            <a:fld id="{3F957EFB-EADF-4750-8B25-D361881BC742}" type="slidenum">
               <a:t>&lt;#&gt;</a:t>
             </a:fld>
           </a:p>
@@ -1423,7 +1423,7 @@
         <p:spPr>
           <a:xfrm>
             <a:off x="1777680" y="2298600"/>
-            <a:ext cx="20827800" cy="4647960"/>
+            <a:ext cx="20827440" cy="4647600"/>
           </a:xfrm>
           <a:prstGeom prst="rect">
             <a:avLst/>
@@ -1441,11 +1441,11 @@
             <a:pPr indent="0" algn="ctr">
               <a:buNone/>
             </a:pPr>
-            <a:endParaRPr b="0" lang="en-US" sz="3000" spc="-1" strike="noStrike">
-              <a:solidFill>
-                <a:srgbClr val="000000"/>
-              </a:solidFill>
-              <a:latin typeface="Helvetica Neue"/>
+            <a:endParaRPr b="0" lang="en-US" sz="4400" spc="-1" strike="noStrike">
+              <a:solidFill>
+                <a:srgbClr val="000000"/>
+              </a:solidFill>
+              <a:latin typeface="arial"/>
             </a:endParaRPr>
           </a:p>
         </p:txBody>
@@ -1462,8 +1462,8 @@
         </p:nvSpPr>
         <p:spPr>
           <a:xfrm>
-            <a:off x="1777680" y="7074000"/>
-            <a:ext cx="10163880" cy="757080"/>
+            <a:off x="1218960" y="3209400"/>
+            <a:ext cx="10708920" cy="3794400"/>
           </a:xfrm>
           <a:prstGeom prst="rect">
             <a:avLst/>
@@ -1484,11 +1484,11 @@
               </a:spcBef>
               <a:buNone/>
             </a:pPr>
-            <a:endParaRPr b="0" lang="en-US" sz="5200" spc="-1" strike="noStrike">
-              <a:solidFill>
-                <a:srgbClr val="000000"/>
-              </a:solidFill>
-              <a:latin typeface="Helvetica Neue"/>
+            <a:endParaRPr b="0" lang="en-US" sz="3200" spc="-1" strike="noStrike">
+              <a:solidFill>
+                <a:srgbClr val="000000"/>
+              </a:solidFill>
+              <a:latin typeface="arial"/>
             </a:endParaRPr>
           </a:p>
         </p:txBody>
@@ -1505,8 +1505,8 @@
         </p:nvSpPr>
         <p:spPr>
           <a:xfrm>
-            <a:off x="12450240" y="7074000"/>
-            <a:ext cx="10163880" cy="1587240"/>
+            <a:off x="12463560" y="3209400"/>
+            <a:ext cx="10708920" cy="7954920"/>
           </a:xfrm>
           <a:prstGeom prst="rect">
             <a:avLst/>
@@ -1527,11 +1527,11 @@
               </a:spcBef>
               <a:buNone/>
             </a:pPr>
-            <a:endParaRPr b="0" lang="en-US" sz="5200" spc="-1" strike="noStrike">
-              <a:solidFill>
-                <a:srgbClr val="000000"/>
-              </a:solidFill>
-              <a:latin typeface="Helvetica Neue"/>
+            <a:endParaRPr b="0" lang="en-US" sz="3200" spc="-1" strike="noStrike">
+              <a:solidFill>
+                <a:srgbClr val="000000"/>
+              </a:solidFill>
+              <a:latin typeface="arial"/>
             </a:endParaRPr>
           </a:p>
         </p:txBody>
@@ -1548,8 +1548,8 @@
         </p:nvSpPr>
         <p:spPr>
           <a:xfrm>
-            <a:off x="1777680" y="7903440"/>
-            <a:ext cx="10163880" cy="757080"/>
+            <a:off x="1218960" y="7364520"/>
+            <a:ext cx="10708920" cy="3794400"/>
           </a:xfrm>
           <a:prstGeom prst="rect">
             <a:avLst/>
@@ -1570,11 +1570,11 @@
               </a:spcBef>
               <a:buNone/>
             </a:pPr>
-            <a:endParaRPr b="0" lang="en-US" sz="5200" spc="-1" strike="noStrike">
-              <a:solidFill>
-                <a:srgbClr val="000000"/>
-              </a:solidFill>
-              <a:latin typeface="Helvetica Neue"/>
+            <a:endParaRPr b="0" lang="en-US" sz="3200" spc="-1" strike="noStrike">
+              <a:solidFill>
+                <a:srgbClr val="000000"/>
+              </a:solidFill>
+              <a:latin typeface="arial"/>
             </a:endParaRPr>
           </a:p>
         </p:txBody>
@@ -1593,7 +1593,7 @@
         <p:txBody>
           <a:bodyPr/>
           <a:p>
-            <a:fld id="{C54C5331-4651-4479-BDB8-238F1DF9A365}" type="slidenum">
+            <a:fld id="{938610CB-006D-4257-BC3C-177475FCBCCB}" type="slidenum">
               <a:t>&lt;#&gt;</a:t>
             </a:fld>
           </a:p>
@@ -1634,7 +1634,7 @@
         <p:spPr>
           <a:xfrm>
             <a:off x="1777680" y="2298600"/>
-            <a:ext cx="20827800" cy="4647960"/>
+            <a:ext cx="20827440" cy="4647600"/>
           </a:xfrm>
           <a:prstGeom prst="rect">
             <a:avLst/>
@@ -1652,11 +1652,11 @@
             <a:pPr indent="0" algn="ctr">
               <a:buNone/>
             </a:pPr>
-            <a:endParaRPr b="0" lang="en-US" sz="3000" spc="-1" strike="noStrike">
-              <a:solidFill>
-                <a:srgbClr val="000000"/>
-              </a:solidFill>
-              <a:latin typeface="Helvetica Neue"/>
+            <a:endParaRPr b="0" lang="en-US" sz="4400" spc="-1" strike="noStrike">
+              <a:solidFill>
+                <a:srgbClr val="000000"/>
+              </a:solidFill>
+              <a:latin typeface="arial"/>
             </a:endParaRPr>
           </a:p>
         </p:txBody>
@@ -1673,8 +1673,8 @@
         </p:nvSpPr>
         <p:spPr>
           <a:xfrm>
-            <a:off x="1777680" y="7074000"/>
-            <a:ext cx="10163880" cy="1587240"/>
+            <a:off x="1218960" y="3209400"/>
+            <a:ext cx="10708920" cy="7954920"/>
           </a:xfrm>
           <a:prstGeom prst="rect">
             <a:avLst/>
@@ -1695,11 +1695,11 @@
               </a:spcBef>
               <a:buNone/>
             </a:pPr>
-            <a:endParaRPr b="0" lang="en-US" sz="5200" spc="-1" strike="noStrike">
-              <a:solidFill>
-                <a:srgbClr val="000000"/>
-              </a:solidFill>
-              <a:latin typeface="Helvetica Neue"/>
+            <a:endParaRPr b="0" lang="en-US" sz="3200" spc="-1" strike="noStrike">
+              <a:solidFill>
+                <a:srgbClr val="000000"/>
+              </a:solidFill>
+              <a:latin typeface="arial"/>
             </a:endParaRPr>
           </a:p>
         </p:txBody>
@@ -1716,8 +1716,8 @@
         </p:nvSpPr>
         <p:spPr>
           <a:xfrm>
-            <a:off x="12450240" y="7074000"/>
-            <a:ext cx="10163880" cy="757080"/>
+            <a:off x="12463560" y="3209400"/>
+            <a:ext cx="10708920" cy="3794400"/>
           </a:xfrm>
           <a:prstGeom prst="rect">
             <a:avLst/>
@@ -1738,11 +1738,11 @@
               </a:spcBef>
               <a:buNone/>
             </a:pPr>
-            <a:endParaRPr b="0" lang="en-US" sz="5200" spc="-1" strike="noStrike">
-              <a:solidFill>
-                <a:srgbClr val="000000"/>
-              </a:solidFill>
-              <a:latin typeface="Helvetica Neue"/>
+            <a:endParaRPr b="0" lang="en-US" sz="3200" spc="-1" strike="noStrike">
+              <a:solidFill>
+                <a:srgbClr val="000000"/>
+              </a:solidFill>
+              <a:latin typeface="arial"/>
             </a:endParaRPr>
           </a:p>
         </p:txBody>
@@ -1759,8 +1759,8 @@
         </p:nvSpPr>
         <p:spPr>
           <a:xfrm>
-            <a:off x="12450240" y="7903440"/>
-            <a:ext cx="10163880" cy="757080"/>
+            <a:off x="12463560" y="7364520"/>
+            <a:ext cx="10708920" cy="3794400"/>
           </a:xfrm>
           <a:prstGeom prst="rect">
             <a:avLst/>
@@ -1781,11 +1781,11 @@
               </a:spcBef>
               <a:buNone/>
             </a:pPr>
-            <a:endParaRPr b="0" lang="en-US" sz="5200" spc="-1" strike="noStrike">
-              <a:solidFill>
-                <a:srgbClr val="000000"/>
-              </a:solidFill>
-              <a:latin typeface="Helvetica Neue"/>
+            <a:endParaRPr b="0" lang="en-US" sz="3200" spc="-1" strike="noStrike">
+              <a:solidFill>
+                <a:srgbClr val="000000"/>
+              </a:solidFill>
+              <a:latin typeface="arial"/>
             </a:endParaRPr>
           </a:p>
         </p:txBody>
@@ -1804,7 +1804,7 @@
         <p:txBody>
           <a:bodyPr/>
           <a:p>
-            <a:fld id="{FF156754-AF05-4C35-AC49-EF5BDE277241}" type="slidenum">
+            <a:fld id="{C1655C1E-2DFF-4DBC-B6BA-965887BBFB1B}" type="slidenum">
               <a:t>&lt;#&gt;</a:t>
             </a:fld>
           </a:p>
@@ -1845,7 +1845,7 @@
         <p:spPr>
           <a:xfrm>
             <a:off x="1777680" y="2298600"/>
-            <a:ext cx="20827800" cy="4647960"/>
+            <a:ext cx="20827440" cy="4647600"/>
           </a:xfrm>
           <a:prstGeom prst="rect">
             <a:avLst/>
@@ -1863,11 +1863,11 @@
             <a:pPr indent="0" algn="ctr">
               <a:buNone/>
             </a:pPr>
-            <a:endParaRPr b="0" lang="en-US" sz="3000" spc="-1" strike="noStrike">
-              <a:solidFill>
-                <a:srgbClr val="000000"/>
-              </a:solidFill>
-              <a:latin typeface="Helvetica Neue"/>
+            <a:endParaRPr b="0" lang="en-US" sz="4400" spc="-1" strike="noStrike">
+              <a:solidFill>
+                <a:srgbClr val="000000"/>
+              </a:solidFill>
+              <a:latin typeface="arial"/>
             </a:endParaRPr>
           </a:p>
         </p:txBody>
@@ -1884,8 +1884,8 @@
         </p:nvSpPr>
         <p:spPr>
           <a:xfrm>
-            <a:off x="1777680" y="7074000"/>
-            <a:ext cx="10163880" cy="757080"/>
+            <a:off x="1218960" y="3209400"/>
+            <a:ext cx="10708920" cy="3794400"/>
           </a:xfrm>
           <a:prstGeom prst="rect">
             <a:avLst/>
@@ -1906,11 +1906,11 @@
               </a:spcBef>
               <a:buNone/>
             </a:pPr>
-            <a:endParaRPr b="0" lang="en-US" sz="5200" spc="-1" strike="noStrike">
-              <a:solidFill>
-                <a:srgbClr val="000000"/>
-              </a:solidFill>
-              <a:latin typeface="Helvetica Neue"/>
+            <a:endParaRPr b="0" lang="en-US" sz="3200" spc="-1" strike="noStrike">
+              <a:solidFill>
+                <a:srgbClr val="000000"/>
+              </a:solidFill>
+              <a:latin typeface="arial"/>
             </a:endParaRPr>
           </a:p>
         </p:txBody>
@@ -1927,8 +1927,8 @@
         </p:nvSpPr>
         <p:spPr>
           <a:xfrm>
-            <a:off x="12450240" y="7074000"/>
-            <a:ext cx="10163880" cy="757080"/>
+            <a:off x="12463560" y="3209400"/>
+            <a:ext cx="10708920" cy="3794400"/>
           </a:xfrm>
           <a:prstGeom prst="rect">
             <a:avLst/>
@@ -1949,11 +1949,11 @@
               </a:spcBef>
               <a:buNone/>
             </a:pPr>
-            <a:endParaRPr b="0" lang="en-US" sz="5200" spc="-1" strike="noStrike">
-              <a:solidFill>
-                <a:srgbClr val="000000"/>
-              </a:solidFill>
-              <a:latin typeface="Helvetica Neue"/>
+            <a:endParaRPr b="0" lang="en-US" sz="3200" spc="-1" strike="noStrike">
+              <a:solidFill>
+                <a:srgbClr val="000000"/>
+              </a:solidFill>
+              <a:latin typeface="arial"/>
             </a:endParaRPr>
           </a:p>
         </p:txBody>
@@ -1970,8 +1970,8 @@
         </p:nvSpPr>
         <p:spPr>
           <a:xfrm>
-            <a:off x="1777680" y="7903440"/>
-            <a:ext cx="20827800" cy="757080"/>
+            <a:off x="1218960" y="7364520"/>
+            <a:ext cx="21944880" cy="3794400"/>
           </a:xfrm>
           <a:prstGeom prst="rect">
             <a:avLst/>
@@ -1992,11 +1992,11 @@
               </a:spcBef>
               <a:buNone/>
             </a:pPr>
-            <a:endParaRPr b="0" lang="en-US" sz="5200" spc="-1" strike="noStrike">
-              <a:solidFill>
-                <a:srgbClr val="000000"/>
-              </a:solidFill>
-              <a:latin typeface="Helvetica Neue"/>
+            <a:endParaRPr b="0" lang="en-US" sz="3200" spc="-1" strike="noStrike">
+              <a:solidFill>
+                <a:srgbClr val="000000"/>
+              </a:solidFill>
+              <a:latin typeface="arial"/>
             </a:endParaRPr>
           </a:p>
         </p:txBody>
@@ -2015,7 +2015,7 @@
         <p:txBody>
           <a:bodyPr/>
           <a:p>
-            <a:fld id="{64A900C6-BE59-46A1-ACA7-44427A1C67D6}" type="slidenum">
+            <a:fld id="{C6704D23-1C4D-4169-8133-AA7C04438B06}" type="slidenum">
               <a:t>&lt;#&gt;</a:t>
             </a:fld>
           </a:p>
@@ -2063,55 +2063,38 @@
         <p:spPr>
           <a:xfrm>
             <a:off x="1777680" y="2298600"/>
-            <a:ext cx="20827800" cy="4647960"/>
+            <a:ext cx="20827440" cy="4647600"/>
           </a:xfrm>
           <a:prstGeom prst="rect">
             <a:avLst/>
           </a:prstGeom>
           <a:noFill/>
-          <a:ln w="12600">
-            <a:noFill/>
-          </a:ln>
-        </p:spPr>
-        <p:txBody>
-          <a:bodyPr lIns="50760" rIns="50760" tIns="50760" bIns="50760" anchor="b">
+          <a:ln w="0">
+            <a:noFill/>
+          </a:ln>
+        </p:spPr>
+        <p:txBody>
+          <a:bodyPr lIns="0" rIns="0" tIns="0" bIns="0" anchor="ctr">
             <a:noAutofit/>
           </a:bodyPr>
           <a:p>
-            <a:pPr indent="0" algn="ctr">
-              <a:lnSpc>
-                <a:spcPct val="100000"/>
-              </a:lnSpc>
+            <a:pPr indent="0">
               <a:buNone/>
-              <a:tabLst>
-                <a:tab algn="l" pos="0"/>
-              </a:tabLst>
             </a:pPr>
             <a:r>
-              <a:rPr b="0" lang="en-US" sz="11200" spc="-1" strike="noStrike">
+              <a:rPr b="0" lang="en-US" sz="1800" spc="-1" strike="noStrike">
                 <a:solidFill>
                   <a:srgbClr val="000000"/>
                 </a:solidFill>
-                <a:latin typeface="Helvetica Neue Medium"/>
-                <a:ea typeface="Helvetica Neue Medium"/>
+                <a:latin typeface="arial"/>
               </a:rPr>
-              <a:t>Title </a:t>
+              <a:t>Click to edit the title text format</a:t>
             </a:r>
-            <a:r>
-              <a:rPr b="0" lang="en-US" sz="11200" spc="-1" strike="noStrike">
-                <a:solidFill>
-                  <a:srgbClr val="000000"/>
-                </a:solidFill>
-                <a:latin typeface="Helvetica Neue Medium"/>
-                <a:ea typeface="Helvetica Neue Medium"/>
-              </a:rPr>
-              <a:t>Text</a:t>
-            </a:r>
-            <a:endParaRPr b="0" lang="en-US" sz="11200" spc="-1" strike="noStrike">
-              <a:solidFill>
-                <a:srgbClr val="000000"/>
-              </a:solidFill>
-              <a:latin typeface="Helvetica Neue"/>
+            <a:endParaRPr b="0" lang="en-US" sz="1800" spc="-1" strike="noStrike">
+              <a:solidFill>
+                <a:srgbClr val="000000"/>
+              </a:solidFill>
+              <a:latin typeface="arial"/>
             </a:endParaRPr>
           </a:p>
         </p:txBody>
@@ -2119,170 +2102,6 @@
       <p:sp>
         <p:nvSpPr>
           <p:cNvPr id="1" name="PlaceHolder 2"/>
-          <p:cNvSpPr>
-            <a:spLocks noGrp="1"/>
-          </p:cNvSpPr>
-          <p:nvPr>
-            <p:ph type="body"/>
-          </p:nvPr>
-        </p:nvSpPr>
-        <p:spPr>
-          <a:xfrm>
-            <a:off x="1777680" y="7074000"/>
-            <a:ext cx="20827800" cy="1587240"/>
-          </a:xfrm>
-          <a:prstGeom prst="rect">
-            <a:avLst/>
-          </a:prstGeom>
-          <a:noFill/>
-          <a:ln w="12600">
-            <a:noFill/>
-          </a:ln>
-        </p:spPr>
-        <p:txBody>
-          <a:bodyPr lIns="50760" rIns="50760" tIns="50760" bIns="50760" anchor="t">
-            <a:noAutofit/>
-          </a:bodyPr>
-          <a:p>
-            <a:pPr indent="0" algn="ctr">
-              <a:lnSpc>
-                <a:spcPct val="100000"/>
-              </a:lnSpc>
-              <a:buNone/>
-              <a:tabLst>
-                <a:tab algn="l" pos="0"/>
-              </a:tabLst>
-            </a:pPr>
-            <a:r>
-              <a:rPr b="0" lang="en-US" sz="5400" spc="-1" strike="noStrike">
-                <a:solidFill>
-                  <a:srgbClr val="000000"/>
-                </a:solidFill>
-                <a:latin typeface="Helvetica Neue"/>
-                <a:ea typeface="Helvetica Neue"/>
-              </a:rPr>
-              <a:t>Body Level One</a:t>
-            </a:r>
-            <a:endParaRPr b="0" lang="en-US" sz="5400" spc="-1" strike="noStrike">
-              <a:solidFill>
-                <a:srgbClr val="000000"/>
-              </a:solidFill>
-              <a:latin typeface="Helvetica Neue"/>
-            </a:endParaRPr>
-          </a:p>
-          <a:p>
-            <a:pPr indent="0" algn="ctr">
-              <a:lnSpc>
-                <a:spcPct val="100000"/>
-              </a:lnSpc>
-              <a:buNone/>
-              <a:tabLst>
-                <a:tab algn="l" pos="0"/>
-              </a:tabLst>
-            </a:pPr>
-            <a:r>
-              <a:rPr b="0" lang="en-US" sz="5400" spc="-1" strike="noStrike">
-                <a:solidFill>
-                  <a:srgbClr val="000000"/>
-                </a:solidFill>
-                <a:latin typeface="Helvetica Neue"/>
-                <a:ea typeface="Helvetica Neue"/>
-              </a:rPr>
-              <a:t>Body Level Two</a:t>
-            </a:r>
-            <a:endParaRPr b="0" lang="en-US" sz="5400" spc="-1" strike="noStrike">
-              <a:solidFill>
-                <a:srgbClr val="000000"/>
-              </a:solidFill>
-              <a:latin typeface="Helvetica Neue"/>
-            </a:endParaRPr>
-          </a:p>
-          <a:p>
-            <a:pPr indent="0" algn="ctr">
-              <a:lnSpc>
-                <a:spcPct val="100000"/>
-              </a:lnSpc>
-              <a:buNone/>
-              <a:tabLst>
-                <a:tab algn="l" pos="0"/>
-              </a:tabLst>
-            </a:pPr>
-            <a:r>
-              <a:rPr b="0" lang="en-US" sz="5400" spc="-1" strike="noStrike">
-                <a:solidFill>
-                  <a:srgbClr val="000000"/>
-                </a:solidFill>
-                <a:latin typeface="Helvetica Neue"/>
-                <a:ea typeface="Helvetica Neue"/>
-              </a:rPr>
-              <a:t>Body Level Three</a:t>
-            </a:r>
-            <a:endParaRPr b="0" lang="en-US" sz="5400" spc="-1" strike="noStrike">
-              <a:solidFill>
-                <a:srgbClr val="000000"/>
-              </a:solidFill>
-              <a:latin typeface="Helvetica Neue"/>
-            </a:endParaRPr>
-          </a:p>
-          <a:p>
-            <a:pPr indent="0" algn="ctr">
-              <a:lnSpc>
-                <a:spcPct val="100000"/>
-              </a:lnSpc>
-              <a:buNone/>
-              <a:tabLst>
-                <a:tab algn="l" pos="0"/>
-              </a:tabLst>
-            </a:pPr>
-            <a:r>
-              <a:rPr b="0" lang="en-US" sz="5400" spc="-1" strike="noStrike">
-                <a:solidFill>
-                  <a:srgbClr val="000000"/>
-                </a:solidFill>
-                <a:latin typeface="Helvetica Neue"/>
-                <a:ea typeface="Helvetica Neue"/>
-              </a:rPr>
-              <a:t>Body Level Four</a:t>
-            </a:r>
-            <a:endParaRPr b="0" lang="en-US" sz="5400" spc="-1" strike="noStrike">
-              <a:solidFill>
-                <a:srgbClr val="000000"/>
-              </a:solidFill>
-              <a:latin typeface="Helvetica Neue"/>
-            </a:endParaRPr>
-          </a:p>
-          <a:p>
-            <a:pPr indent="0" algn="ctr">
-              <a:lnSpc>
-                <a:spcPct val="100000"/>
-              </a:lnSpc>
-              <a:buNone/>
-              <a:tabLst>
-                <a:tab algn="l" pos="0"/>
-              </a:tabLst>
-            </a:pPr>
-            <a:r>
-              <a:rPr b="0" lang="en-US" sz="5400" spc="-1" strike="noStrike">
-                <a:solidFill>
-                  <a:srgbClr val="000000"/>
-                </a:solidFill>
-                <a:latin typeface="Helvetica Neue"/>
-                <a:ea typeface="Helvetica Neue"/>
-              </a:rPr>
-              <a:t>Body Level Five</a:t>
-            </a:r>
-            <a:endParaRPr b="0" lang="en-US" sz="5400" spc="-1" strike="noStrike">
-              <a:solidFill>
-                <a:srgbClr val="000000"/>
-              </a:solidFill>
-              <a:latin typeface="Helvetica Neue"/>
-            </a:endParaRPr>
-          </a:p>
-        </p:txBody>
-      </p:sp>
-      <p:sp>
-        <p:nvSpPr>
-          <p:cNvPr id="2" name="PlaceHolder 3"/>
           <p:cNvSpPr>
             <a:spLocks noGrp="1"/>
           </p:cNvSpPr>
@@ -2293,7 +2112,7 @@
         <p:spPr>
           <a:xfrm>
             <a:off x="11958840" y="13080960"/>
-            <a:ext cx="452880" cy="460800"/>
+            <a:ext cx="452520" cy="460440"/>
           </a:xfrm>
           <a:prstGeom prst="rect">
             <a:avLst/>
@@ -2335,7 +2154,7 @@
                 <a:tab algn="l" pos="0"/>
               </a:tabLst>
             </a:pPr>
-            <a:fld id="{6FDF1A73-54D4-4C76-9780-821947F7ACEF}" type="slidenum">
+            <a:fld id="{C38DA72E-DA6E-4BB7-9280-8013F0D1CEEF}" type="slidenum">
               <a:rPr b="0" lang="en-US" sz="2400" spc="-1" strike="noStrike">
                 <a:solidFill>
                   <a:srgbClr val="000000"/>
@@ -2350,6 +2169,231 @@
                 <a:srgbClr val="000000"/>
               </a:solidFill>
               <a:latin typeface="Tinos"/>
+            </a:endParaRPr>
+          </a:p>
+        </p:txBody>
+      </p:sp>
+      <p:sp>
+        <p:nvSpPr>
+          <p:cNvPr id="2" name="PlaceHolder 3"/>
+          <p:cNvSpPr>
+            <a:spLocks noGrp="1"/>
+          </p:cNvSpPr>
+          <p:nvPr>
+            <p:ph type="body"/>
+          </p:nvPr>
+        </p:nvSpPr>
+        <p:spPr>
+          <a:xfrm>
+            <a:off x="1218960" y="3209400"/>
+            <a:ext cx="21944880" cy="7954920"/>
+          </a:xfrm>
+          <a:prstGeom prst="rect">
+            <a:avLst/>
+          </a:prstGeom>
+          <a:noFill/>
+          <a:ln w="0">
+            <a:noFill/>
+          </a:ln>
+        </p:spPr>
+        <p:txBody>
+          <a:bodyPr lIns="0" rIns="0" tIns="0" bIns="0" anchor="t">
+            <a:normAutofit/>
+          </a:bodyPr>
+          <a:p>
+            <a:pPr marL="432000" indent="-324000">
+              <a:spcBef>
+                <a:spcPts val="1417"/>
+              </a:spcBef>
+              <a:buClr>
+                <a:srgbClr val="000000"/>
+              </a:buClr>
+              <a:buSzPct val="45000"/>
+              <a:buFont typeface="Wingdings" charset="2"/>
+              <a:buChar char=""/>
+            </a:pPr>
+            <a:r>
+              <a:rPr b="0" lang="en-US" sz="3200" spc="-1" strike="noStrike">
+                <a:solidFill>
+                  <a:srgbClr val="000000"/>
+                </a:solidFill>
+                <a:latin typeface="arial"/>
+              </a:rPr>
+              <a:t>Click to edit the outline text format</a:t>
+            </a:r>
+            <a:endParaRPr b="0" lang="en-US" sz="3200" spc="-1" strike="noStrike">
+              <a:solidFill>
+                <a:srgbClr val="000000"/>
+              </a:solidFill>
+              <a:latin typeface="arial"/>
+            </a:endParaRPr>
+          </a:p>
+          <a:p>
+            <a:pPr lvl="1" marL="864000" indent="-324000">
+              <a:spcBef>
+                <a:spcPts val="1134"/>
+              </a:spcBef>
+              <a:buClr>
+                <a:srgbClr val="000000"/>
+              </a:buClr>
+              <a:buSzPct val="75000"/>
+              <a:buFont typeface="Symbol" charset="2"/>
+              <a:buChar char=""/>
+            </a:pPr>
+            <a:r>
+              <a:rPr b="0" lang="en-US" sz="2800" spc="-1" strike="noStrike">
+                <a:solidFill>
+                  <a:srgbClr val="000000"/>
+                </a:solidFill>
+                <a:latin typeface="arial"/>
+              </a:rPr>
+              <a:t>Second Outline Level</a:t>
+            </a:r>
+            <a:endParaRPr b="0" lang="en-US" sz="2800" spc="-1" strike="noStrike">
+              <a:solidFill>
+                <a:srgbClr val="000000"/>
+              </a:solidFill>
+              <a:latin typeface="arial"/>
+            </a:endParaRPr>
+          </a:p>
+          <a:p>
+            <a:pPr lvl="2" marL="1296000" indent="-288000">
+              <a:spcBef>
+                <a:spcPts val="850"/>
+              </a:spcBef>
+              <a:buClr>
+                <a:srgbClr val="000000"/>
+              </a:buClr>
+              <a:buSzPct val="45000"/>
+              <a:buFont typeface="Wingdings" charset="2"/>
+              <a:buChar char=""/>
+            </a:pPr>
+            <a:r>
+              <a:rPr b="0" lang="en-US" sz="2400" spc="-1" strike="noStrike">
+                <a:solidFill>
+                  <a:srgbClr val="000000"/>
+                </a:solidFill>
+                <a:latin typeface="arial"/>
+              </a:rPr>
+              <a:t>Third Outline Level</a:t>
+            </a:r>
+            <a:endParaRPr b="0" lang="en-US" sz="2400" spc="-1" strike="noStrike">
+              <a:solidFill>
+                <a:srgbClr val="000000"/>
+              </a:solidFill>
+              <a:latin typeface="arial"/>
+            </a:endParaRPr>
+          </a:p>
+          <a:p>
+            <a:pPr lvl="3" marL="1728000" indent="-216000">
+              <a:spcBef>
+                <a:spcPts val="567"/>
+              </a:spcBef>
+              <a:buClr>
+                <a:srgbClr val="000000"/>
+              </a:buClr>
+              <a:buSzPct val="75000"/>
+              <a:buFont typeface="Symbol" charset="2"/>
+              <a:buChar char=""/>
+            </a:pPr>
+            <a:r>
+              <a:rPr b="0" lang="en-US" sz="2000" spc="-1" strike="noStrike">
+                <a:solidFill>
+                  <a:srgbClr val="000000"/>
+                </a:solidFill>
+                <a:latin typeface="arial"/>
+              </a:rPr>
+              <a:t>Fourth Outline Level</a:t>
+            </a:r>
+            <a:endParaRPr b="0" lang="en-US" sz="2000" spc="-1" strike="noStrike">
+              <a:solidFill>
+                <a:srgbClr val="000000"/>
+              </a:solidFill>
+              <a:latin typeface="arial"/>
+            </a:endParaRPr>
+          </a:p>
+          <a:p>
+            <a:pPr lvl="4" marL="2160000" indent="-216000">
+              <a:spcBef>
+                <a:spcPts val="283"/>
+              </a:spcBef>
+              <a:buClr>
+                <a:srgbClr val="000000"/>
+              </a:buClr>
+              <a:buSzPct val="45000"/>
+              <a:buFont typeface="Wingdings" charset="2"/>
+              <a:buChar char=""/>
+            </a:pPr>
+            <a:r>
+              <a:rPr b="0" lang="en-US" sz="2000" spc="-1" strike="noStrike">
+                <a:solidFill>
+                  <a:srgbClr val="000000"/>
+                </a:solidFill>
+                <a:latin typeface="arial"/>
+              </a:rPr>
+              <a:t>Fifth Outline Level</a:t>
+            </a:r>
+            <a:endParaRPr b="0" lang="en-US" sz="2000" spc="-1" strike="noStrike">
+              <a:solidFill>
+                <a:srgbClr val="000000"/>
+              </a:solidFill>
+              <a:latin typeface="arial"/>
+            </a:endParaRPr>
+          </a:p>
+          <a:p>
+            <a:pPr lvl="5" marL="2592000" indent="-216000">
+              <a:spcBef>
+                <a:spcPts val="283"/>
+              </a:spcBef>
+              <a:buClr>
+                <a:srgbClr val="000000"/>
+              </a:buClr>
+              <a:buSzPct val="45000"/>
+              <a:buFont typeface="Wingdings" charset="2"/>
+              <a:buChar char=""/>
+            </a:pPr>
+            <a:r>
+              <a:rPr b="0" lang="en-US" sz="2000" spc="-1" strike="noStrike">
+                <a:solidFill>
+                  <a:srgbClr val="000000"/>
+                </a:solidFill>
+                <a:latin typeface="arial"/>
+              </a:rPr>
+              <a:t>Sixth Outline Level</a:t>
+            </a:r>
+            <a:endParaRPr b="0" lang="en-US" sz="2000" spc="-1" strike="noStrike">
+              <a:solidFill>
+                <a:srgbClr val="000000"/>
+              </a:solidFill>
+              <a:latin typeface="arial"/>
+            </a:endParaRPr>
+          </a:p>
+          <a:p>
+            <a:pPr lvl="6" marL="3024000" indent="-216000">
+              <a:spcBef>
+                <a:spcPts val="283"/>
+              </a:spcBef>
+              <a:buClr>
+                <a:srgbClr val="000000"/>
+              </a:buClr>
+              <a:buSzPct val="45000"/>
+              <a:buFont typeface="Wingdings" charset="2"/>
+              <a:buChar char=""/>
+            </a:pPr>
+            <a:r>
+              <a:rPr b="0" lang="en-US" sz="2000" spc="-1" strike="noStrike">
+                <a:solidFill>
+                  <a:srgbClr val="000000"/>
+                </a:solidFill>
+                <a:latin typeface="arial"/>
+              </a:rPr>
+              <a:t>Seventh Outline Level</a:t>
+            </a:r>
+            <a:endParaRPr b="0" lang="en-US" sz="2000" spc="-1" strike="noStrike">
+              <a:solidFill>
+                <a:srgbClr val="000000"/>
+              </a:solidFill>
+              <a:latin typeface="arial"/>
             </a:endParaRPr>
           </a:p>
         </p:txBody>
@@ -2391,62 +2435,16 @@
           <a:chExt cx="0" cy="0"/>
         </a:xfrm>
       </p:grpSpPr>
-      <p:pic>
-        <p:nvPicPr>
-          <p:cNvPr id="39" name="Image" descr="Image"/>
-          <p:cNvPicPr/>
-          <p:nvPr/>
-        </p:nvPicPr>
-        <p:blipFill>
-          <a:blip r:embed="rId1"/>
-          <a:stretch/>
-        </p:blipFill>
-        <p:spPr>
-          <a:xfrm>
-            <a:off x="5119200" y="11093400"/>
-            <a:ext cx="9033480" cy="1447560"/>
-          </a:xfrm>
-          <a:prstGeom prst="rect">
-            <a:avLst/>
-          </a:prstGeom>
-          <a:ln w="12700">
-            <a:noFill/>
-          </a:ln>
-        </p:spPr>
-      </p:pic>
-      <p:pic>
-        <p:nvPicPr>
-          <p:cNvPr id="40" name="Image" descr="Image"/>
-          <p:cNvPicPr/>
-          <p:nvPr/>
-        </p:nvPicPr>
-        <p:blipFill>
-          <a:blip r:embed="rId2"/>
-          <a:stretch/>
-        </p:blipFill>
-        <p:spPr>
-          <a:xfrm>
-            <a:off x="13573800" y="7482600"/>
-            <a:ext cx="9624240" cy="1110240"/>
-          </a:xfrm>
-          <a:prstGeom prst="rect">
-            <a:avLst/>
-          </a:prstGeom>
-          <a:ln w="12700">
-            <a:noFill/>
-          </a:ln>
-        </p:spPr>
-      </p:pic>
-      <p:sp>
-        <p:nvSpPr>
-          <p:cNvPr id="41" name="Rectangle"/>
+      <p:sp>
+        <p:nvSpPr>
+          <p:cNvPr id="39" name="Rectangle"/>
           <p:cNvSpPr/>
           <p:nvPr/>
         </p:nvSpPr>
         <p:spPr>
           <a:xfrm>
-            <a:off x="13687920" y="7715520"/>
-            <a:ext cx="970920" cy="674640"/>
+            <a:off x="13399920" y="7679520"/>
+            <a:ext cx="970560" cy="674280"/>
           </a:xfrm>
           <a:prstGeom prst="rect">
             <a:avLst/>
@@ -2491,14 +2489,14 @@
       </p:sp>
       <p:sp>
         <p:nvSpPr>
-          <p:cNvPr id="42" name="Rectangle"/>
+          <p:cNvPr id="40" name="Rectangle"/>
           <p:cNvSpPr/>
           <p:nvPr/>
         </p:nvSpPr>
         <p:spPr>
           <a:xfrm>
             <a:off x="16099920" y="7665840"/>
-            <a:ext cx="303120" cy="434520"/>
+            <a:ext cx="302760" cy="434160"/>
           </a:xfrm>
           <a:prstGeom prst="rect">
             <a:avLst/>
@@ -2543,14 +2541,14 @@
       </p:sp>
       <p:sp>
         <p:nvSpPr>
-          <p:cNvPr id="43" name="Rectangle"/>
+          <p:cNvPr id="41" name="Rectangle"/>
           <p:cNvSpPr/>
           <p:nvPr/>
         </p:nvSpPr>
         <p:spPr>
           <a:xfrm>
             <a:off x="16095240" y="8107200"/>
-            <a:ext cx="303120" cy="453240"/>
+            <a:ext cx="302760" cy="452880"/>
           </a:xfrm>
           <a:prstGeom prst="rect">
             <a:avLst/>
@@ -2595,14 +2593,14 @@
       </p:sp>
       <p:sp>
         <p:nvSpPr>
-          <p:cNvPr id="44" name="Rectangle"/>
+          <p:cNvPr id="42" name="Rectangle"/>
           <p:cNvSpPr/>
           <p:nvPr/>
         </p:nvSpPr>
         <p:spPr>
           <a:xfrm>
             <a:off x="17429040" y="8102520"/>
-            <a:ext cx="303120" cy="453600"/>
+            <a:ext cx="302760" cy="453240"/>
           </a:xfrm>
           <a:prstGeom prst="rect">
             <a:avLst/>
@@ -2647,14 +2645,14 @@
       </p:sp>
       <p:sp>
         <p:nvSpPr>
-          <p:cNvPr id="45" name="Rectangle"/>
+          <p:cNvPr id="43" name="Rectangle"/>
           <p:cNvSpPr/>
           <p:nvPr/>
         </p:nvSpPr>
         <p:spPr>
           <a:xfrm>
             <a:off x="16546680" y="7696080"/>
-            <a:ext cx="303480" cy="453600"/>
+            <a:ext cx="303120" cy="453240"/>
           </a:xfrm>
           <a:prstGeom prst="rect">
             <a:avLst/>
@@ -2699,14 +2697,14 @@
       </p:sp>
       <p:sp>
         <p:nvSpPr>
-          <p:cNvPr id="46" name="Rectangle"/>
+          <p:cNvPr id="44" name="Rectangle"/>
           <p:cNvSpPr/>
           <p:nvPr/>
         </p:nvSpPr>
         <p:spPr>
           <a:xfrm>
-            <a:off x="18145440" y="7696800"/>
-            <a:ext cx="436320" cy="453240"/>
+            <a:off x="18541440" y="7660800"/>
+            <a:ext cx="435960" cy="452880"/>
           </a:xfrm>
           <a:prstGeom prst="rect">
             <a:avLst/>
@@ -2751,14 +2749,14 @@
       </p:sp>
       <p:sp>
         <p:nvSpPr>
-          <p:cNvPr id="47" name="Rectangle"/>
+          <p:cNvPr id="45" name="Rectangle"/>
           <p:cNvSpPr/>
           <p:nvPr/>
         </p:nvSpPr>
         <p:spPr>
           <a:xfrm>
-            <a:off x="18748440" y="7676640"/>
-            <a:ext cx="436680" cy="453600"/>
+            <a:off x="19144440" y="7640640"/>
+            <a:ext cx="436320" cy="453240"/>
           </a:xfrm>
           <a:prstGeom prst="rect">
             <a:avLst/>
@@ -2803,14 +2801,14 @@
       </p:sp>
       <p:sp>
         <p:nvSpPr>
-          <p:cNvPr id="48" name="Rectangle"/>
+          <p:cNvPr id="46" name="Rectangle"/>
           <p:cNvSpPr/>
           <p:nvPr/>
         </p:nvSpPr>
         <p:spPr>
           <a:xfrm>
-            <a:off x="19104120" y="8071200"/>
-            <a:ext cx="559800" cy="453600"/>
+            <a:off x="19536120" y="8071200"/>
+            <a:ext cx="559440" cy="453240"/>
           </a:xfrm>
           <a:prstGeom prst="rect">
             <a:avLst/>
@@ -2855,14 +2853,14 @@
       </p:sp>
       <p:sp>
         <p:nvSpPr>
-          <p:cNvPr id="49" name="Rectangle"/>
+          <p:cNvPr id="47" name="Rectangle"/>
           <p:cNvSpPr/>
           <p:nvPr/>
         </p:nvSpPr>
         <p:spPr>
           <a:xfrm>
-            <a:off x="19760400" y="8064360"/>
-            <a:ext cx="487800" cy="453600"/>
+            <a:off x="20192400" y="8064360"/>
+            <a:ext cx="487440" cy="453240"/>
           </a:xfrm>
           <a:prstGeom prst="rect">
             <a:avLst/>
@@ -2907,14 +2905,14 @@
       </p:sp>
       <p:sp>
         <p:nvSpPr>
-          <p:cNvPr id="50" name="Vertical morphing"/>
+          <p:cNvPr id="48" name="Vertical morphing"/>
           <p:cNvSpPr/>
           <p:nvPr/>
         </p:nvSpPr>
         <p:spPr>
           <a:xfrm>
             <a:off x="14294880" y="8555040"/>
-            <a:ext cx="2253240" cy="378000"/>
+            <a:ext cx="2252880" cy="377640"/>
           </a:xfrm>
           <a:prstGeom prst="rect">
             <a:avLst/>
@@ -2964,14 +2962,14 @@
       </p:sp>
       <p:sp>
         <p:nvSpPr>
-          <p:cNvPr id="51" name="Rectangle"/>
+          <p:cNvPr id="49" name="Rectangle"/>
           <p:cNvSpPr/>
           <p:nvPr/>
         </p:nvSpPr>
         <p:spPr>
           <a:xfrm>
-            <a:off x="18498600" y="8170560"/>
-            <a:ext cx="287640" cy="324000"/>
+            <a:off x="18786600" y="8098560"/>
+            <a:ext cx="287280" cy="323640"/>
           </a:xfrm>
           <a:prstGeom prst="rect">
             <a:avLst/>
@@ -3016,14 +3014,14 @@
       </p:sp>
       <p:sp>
         <p:nvSpPr>
-          <p:cNvPr id="52" name="Rectangle"/>
+          <p:cNvPr id="50" name="Rectangle"/>
           <p:cNvSpPr/>
           <p:nvPr/>
         </p:nvSpPr>
         <p:spPr>
           <a:xfrm>
             <a:off x="21900960" y="9725400"/>
-            <a:ext cx="866520" cy="656640"/>
+            <a:ext cx="866160" cy="656280"/>
           </a:xfrm>
           <a:prstGeom prst="rect">
             <a:avLst/>
@@ -3064,177 +3062,16 @@
           </a:p>
         </p:txBody>
       </p:sp>
-      <p:pic>
-        <p:nvPicPr>
-          <p:cNvPr id="53" name="Image" descr="Image"/>
-          <p:cNvPicPr/>
-          <p:nvPr/>
-        </p:nvPicPr>
-        <p:blipFill>
-          <a:blip r:embed="rId3"/>
-          <a:stretch/>
-        </p:blipFill>
-        <p:spPr>
-          <a:xfrm>
-            <a:off x="4084920" y="349200"/>
-            <a:ext cx="11341800" cy="1488240"/>
-          </a:xfrm>
-          <a:prstGeom prst="rect">
-            <a:avLst/>
-          </a:prstGeom>
-          <a:ln w="12700">
-            <a:noFill/>
-          </a:ln>
-        </p:spPr>
-      </p:pic>
-      <p:pic>
-        <p:nvPicPr>
-          <p:cNvPr id="54" name="Image" descr="Image"/>
-          <p:cNvPicPr/>
-          <p:nvPr/>
-        </p:nvPicPr>
-        <p:blipFill>
-          <a:blip r:embed="rId4"/>
-          <a:stretch/>
-        </p:blipFill>
-        <p:spPr>
-          <a:xfrm>
-            <a:off x="6402600" y="2406600"/>
-            <a:ext cx="10288800" cy="1751760"/>
-          </a:xfrm>
-          <a:prstGeom prst="rect">
-            <a:avLst/>
-          </a:prstGeom>
-          <a:ln w="12700">
-            <a:noFill/>
-          </a:ln>
-        </p:spPr>
-      </p:pic>
-      <p:pic>
-        <p:nvPicPr>
-          <p:cNvPr id="55" name="Image" descr="Image"/>
-          <p:cNvPicPr/>
-          <p:nvPr/>
-        </p:nvPicPr>
-        <p:blipFill>
-          <a:blip r:embed="rId5"/>
-          <a:stretch/>
-        </p:blipFill>
-        <p:spPr>
-          <a:xfrm>
-            <a:off x="1984680" y="5344560"/>
-            <a:ext cx="8929080" cy="1261440"/>
-          </a:xfrm>
-          <a:prstGeom prst="rect">
-            <a:avLst/>
-          </a:prstGeom>
-          <a:ln w="12700">
-            <a:noFill/>
-          </a:ln>
-        </p:spPr>
-      </p:pic>
-      <p:pic>
-        <p:nvPicPr>
-          <p:cNvPr id="56" name="Image" descr="Image"/>
-          <p:cNvPicPr/>
-          <p:nvPr/>
-        </p:nvPicPr>
-        <p:blipFill>
-          <a:blip r:embed="rId6"/>
-          <a:stretch/>
-        </p:blipFill>
-        <p:spPr>
-          <a:xfrm>
-            <a:off x="704160" y="8202600"/>
-            <a:ext cx="8579160" cy="1138680"/>
-          </a:xfrm>
-          <a:prstGeom prst="rect">
-            <a:avLst/>
-          </a:prstGeom>
-          <a:ln w="12700">
-            <a:noFill/>
-          </a:ln>
-        </p:spPr>
-      </p:pic>
-      <p:pic>
-        <p:nvPicPr>
-          <p:cNvPr id="57" name="Image" descr="Image"/>
-          <p:cNvPicPr/>
-          <p:nvPr/>
-        </p:nvPicPr>
-        <p:blipFill>
-          <a:blip r:embed="rId7"/>
-          <a:stretch/>
-        </p:blipFill>
-        <p:spPr>
-          <a:xfrm>
-            <a:off x="9917640" y="8122320"/>
-            <a:ext cx="2790000" cy="1616400"/>
-          </a:xfrm>
-          <a:prstGeom prst="rect">
-            <a:avLst/>
-          </a:prstGeom>
-          <a:ln w="12700">
-            <a:noFill/>
-          </a:ln>
-        </p:spPr>
-      </p:pic>
-      <p:pic>
-        <p:nvPicPr>
-          <p:cNvPr id="58" name="Image" descr="Image"/>
-          <p:cNvPicPr/>
-          <p:nvPr/>
-        </p:nvPicPr>
-        <p:blipFill>
-          <a:blip r:embed="rId8"/>
-          <a:stretch/>
-        </p:blipFill>
-        <p:spPr>
-          <a:xfrm>
-            <a:off x="17916120" y="4271040"/>
-            <a:ext cx="4129200" cy="1154160"/>
-          </a:xfrm>
-          <a:prstGeom prst="rect">
-            <a:avLst/>
-          </a:prstGeom>
-          <a:ln w="12700">
-            <a:noFill/>
-          </a:ln>
-        </p:spPr>
-      </p:pic>
-      <p:pic>
-        <p:nvPicPr>
-          <p:cNvPr id="59" name="Image" descr="Image"/>
-          <p:cNvPicPr/>
-          <p:nvPr/>
-        </p:nvPicPr>
-        <p:blipFill>
-          <a:blip r:embed="rId9"/>
-          <a:stretch/>
-        </p:blipFill>
-        <p:spPr>
-          <a:xfrm>
-            <a:off x="16005240" y="5433120"/>
-            <a:ext cx="7383600" cy="1021680"/>
-          </a:xfrm>
-          <a:prstGeom prst="rect">
-            <a:avLst/>
-          </a:prstGeom>
-          <a:ln w="12700">
-            <a:noFill/>
-          </a:ln>
-        </p:spPr>
-      </p:pic>
-      <p:sp>
-        <p:nvSpPr>
-          <p:cNvPr id="60" name="Rectangle"/>
+      <p:sp>
+        <p:nvSpPr>
+          <p:cNvPr id="51" name="Rectangle"/>
           <p:cNvSpPr/>
           <p:nvPr/>
         </p:nvSpPr>
         <p:spPr>
           <a:xfrm>
             <a:off x="10821600" y="793080"/>
-            <a:ext cx="1854360" cy="654840"/>
+            <a:ext cx="1854000" cy="654480"/>
           </a:xfrm>
           <a:prstGeom prst="rect">
             <a:avLst/>
@@ -3279,14 +3116,14 @@
       </p:sp>
       <p:sp>
         <p:nvSpPr>
-          <p:cNvPr id="61" name="Rectangle"/>
+          <p:cNvPr id="52" name="Rectangle"/>
           <p:cNvSpPr/>
           <p:nvPr/>
         </p:nvSpPr>
         <p:spPr>
           <a:xfrm>
-            <a:off x="6612480" y="3081600"/>
-            <a:ext cx="693360" cy="654840"/>
+            <a:off x="5479200" y="3200400"/>
+            <a:ext cx="921600" cy="654480"/>
           </a:xfrm>
           <a:prstGeom prst="rect">
             <a:avLst/>
@@ -3331,22 +3168,22 @@
       </p:sp>
       <p:sp>
         <p:nvSpPr>
-          <p:cNvPr id="62" name="Connection Line"/>
+          <p:cNvPr id="53" name="Connection Line"/>
           <p:cNvSpPr/>
           <p:nvPr/>
         </p:nvSpPr>
         <p:spPr>
           <a:xfrm>
-            <a:off x="6859800" y="1479240"/>
-            <a:ext cx="4025880" cy="1384560"/>
+            <a:off x="7086600" y="1600200"/>
+            <a:ext cx="4114800" cy="1263240"/>
           </a:xfrm>
           <a:custGeom>
             <a:avLst/>
             <a:gdLst>
-              <a:gd name="textAreaLeft" fmla="*/ 0 w 4025880"/>
-              <a:gd name="textAreaRight" fmla="*/ 4026240 w 4025880"/>
-              <a:gd name="textAreaTop" fmla="*/ 0 h 1384560"/>
-              <a:gd name="textAreaBottom" fmla="*/ 1384920 h 1384560"/>
+              <a:gd name="textAreaLeft" fmla="*/ 0 w 4114800"/>
+              <a:gd name="textAreaRight" fmla="*/ 4115520 w 4114800"/>
+              <a:gd name="textAreaTop" fmla="*/ 0 h 1263240"/>
+              <a:gd name="textAreaBottom" fmla="*/ 1263600 h 1263240"/>
             </a:gdLst>
             <a:ahLst/>
             <a:rect l="textAreaLeft" t="textAreaTop" r="textAreaRight" b="textAreaBottom"/>
@@ -3403,14 +3240,14 @@
       </p:sp>
       <p:sp>
         <p:nvSpPr>
-          <p:cNvPr id="63" name="Exp. events per bin"/>
+          <p:cNvPr id="54" name="Exp. events per bin"/>
           <p:cNvSpPr/>
           <p:nvPr/>
         </p:nvSpPr>
         <p:spPr>
           <a:xfrm>
-            <a:off x="10372320" y="416880"/>
-            <a:ext cx="2291760" cy="378000"/>
+            <a:off x="10516320" y="416880"/>
+            <a:ext cx="2291400" cy="377640"/>
           </a:xfrm>
           <a:prstGeom prst="rect">
             <a:avLst/>
@@ -3460,14 +3297,14 @@
       </p:sp>
       <p:sp>
         <p:nvSpPr>
-          <p:cNvPr id="64" name="Rectangle"/>
+          <p:cNvPr id="55" name="Rectangle"/>
           <p:cNvSpPr/>
           <p:nvPr/>
         </p:nvSpPr>
         <p:spPr>
           <a:xfrm>
             <a:off x="13435920" y="797400"/>
-            <a:ext cx="1802160" cy="654840"/>
+            <a:ext cx="1801800" cy="654480"/>
           </a:xfrm>
           <a:prstGeom prst="rect">
             <a:avLst/>
@@ -3512,14 +3349,14 @@
       </p:sp>
       <p:sp>
         <p:nvSpPr>
-          <p:cNvPr id="65" name="Rectangle"/>
+          <p:cNvPr id="56" name="Rectangle"/>
           <p:cNvSpPr/>
           <p:nvPr/>
         </p:nvSpPr>
         <p:spPr>
           <a:xfrm>
-            <a:off x="9563040" y="2995560"/>
-            <a:ext cx="1244160" cy="674640"/>
+            <a:off x="9239040" y="3093840"/>
+            <a:ext cx="1348560" cy="674280"/>
           </a:xfrm>
           <a:prstGeom prst="rect">
             <a:avLst/>
@@ -3564,14 +3401,14 @@
       </p:sp>
       <p:sp>
         <p:nvSpPr>
-          <p:cNvPr id="66" name="Rectangle"/>
+          <p:cNvPr id="57" name="Rectangle"/>
           <p:cNvSpPr/>
           <p:nvPr/>
         </p:nvSpPr>
         <p:spPr>
           <a:xfrm>
-            <a:off x="10847520" y="2999880"/>
-            <a:ext cx="2605320" cy="674640"/>
+            <a:off x="10631520" y="3107880"/>
+            <a:ext cx="3526560" cy="674280"/>
           </a:xfrm>
           <a:prstGeom prst="rect">
             <a:avLst/>
@@ -3616,14 +3453,14 @@
       </p:sp>
       <p:sp>
         <p:nvSpPr>
-          <p:cNvPr id="67" name="Rectangle"/>
+          <p:cNvPr id="58" name="Rectangle"/>
           <p:cNvSpPr/>
           <p:nvPr/>
         </p:nvSpPr>
         <p:spPr>
           <a:xfrm>
-            <a:off x="13477320" y="3000600"/>
-            <a:ext cx="1283760" cy="675000"/>
+            <a:off x="14194080" y="3084840"/>
+            <a:ext cx="1579320" cy="674640"/>
           </a:xfrm>
           <a:prstGeom prst="rect">
             <a:avLst/>
@@ -3668,14 +3505,14 @@
       </p:sp>
       <p:sp>
         <p:nvSpPr>
-          <p:cNvPr id="68" name="Rectangle"/>
+          <p:cNvPr id="59" name="Rectangle"/>
           <p:cNvSpPr/>
           <p:nvPr/>
         </p:nvSpPr>
         <p:spPr>
           <a:xfrm>
-            <a:off x="15133680" y="2995560"/>
-            <a:ext cx="1333800" cy="674640"/>
+            <a:off x="16357680" y="3103560"/>
+            <a:ext cx="1473120" cy="674280"/>
           </a:xfrm>
           <a:prstGeom prst="rect">
             <a:avLst/>
@@ -3720,14 +3557,14 @@
       </p:sp>
       <p:sp>
         <p:nvSpPr>
-          <p:cNvPr id="69" name="Rectangle"/>
+          <p:cNvPr id="60" name="Rectangle"/>
           <p:cNvSpPr/>
           <p:nvPr/>
         </p:nvSpPr>
         <p:spPr>
           <a:xfrm>
-            <a:off x="2851200" y="5675040"/>
-            <a:ext cx="1180440" cy="655200"/>
+            <a:off x="1807200" y="5675040"/>
+            <a:ext cx="1180080" cy="654840"/>
           </a:xfrm>
           <a:prstGeom prst="rect">
             <a:avLst/>
@@ -3772,14 +3609,14 @@
       </p:sp>
       <p:sp>
         <p:nvSpPr>
-          <p:cNvPr id="70" name="Rectangle"/>
+          <p:cNvPr id="61" name="Rectangle"/>
           <p:cNvSpPr/>
           <p:nvPr/>
         </p:nvSpPr>
         <p:spPr>
           <a:xfrm>
-            <a:off x="4570200" y="5675760"/>
-            <a:ext cx="906480" cy="654840"/>
+            <a:off x="3598200" y="5675760"/>
+            <a:ext cx="973800" cy="654480"/>
           </a:xfrm>
           <a:prstGeom prst="rect">
             <a:avLst/>
@@ -3824,14 +3661,14 @@
       </p:sp>
       <p:sp>
         <p:nvSpPr>
-          <p:cNvPr id="71" name="Rectangle"/>
+          <p:cNvPr id="62" name="Rectangle"/>
           <p:cNvSpPr/>
           <p:nvPr/>
         </p:nvSpPr>
         <p:spPr>
           <a:xfrm>
-            <a:off x="5984280" y="5675760"/>
-            <a:ext cx="3256560" cy="654840"/>
+            <a:off x="5156280" y="5675760"/>
+            <a:ext cx="3759120" cy="654480"/>
           </a:xfrm>
           <a:prstGeom prst="rect">
             <a:avLst/>
@@ -3876,14 +3713,14 @@
       </p:sp>
       <p:sp>
         <p:nvSpPr>
-          <p:cNvPr id="72" name="Rectangle"/>
+          <p:cNvPr id="63" name="Rectangle"/>
           <p:cNvSpPr/>
           <p:nvPr/>
         </p:nvSpPr>
         <p:spPr>
           <a:xfrm>
-            <a:off x="9748800" y="5694480"/>
-            <a:ext cx="906480" cy="655200"/>
+            <a:off x="9372600" y="5694480"/>
+            <a:ext cx="1282320" cy="654840"/>
           </a:xfrm>
           <a:prstGeom prst="rect">
             <a:avLst/>
@@ -3928,22 +3765,22 @@
       </p:sp>
       <p:sp>
         <p:nvSpPr>
-          <p:cNvPr id="73" name="Connection Line"/>
+          <p:cNvPr id="64" name="Connection Line"/>
           <p:cNvSpPr/>
           <p:nvPr/>
         </p:nvSpPr>
         <p:spPr>
           <a:xfrm>
             <a:off x="13489200" y="8592840"/>
-            <a:ext cx="4800600" cy="2310480"/>
+            <a:ext cx="4800240" cy="2310120"/>
           </a:xfrm>
           <a:custGeom>
             <a:avLst/>
             <a:gdLst>
-              <a:gd name="textAreaLeft" fmla="*/ 0 w 4800600"/>
-              <a:gd name="textAreaRight" fmla="*/ 4800960 w 4800600"/>
-              <a:gd name="textAreaTop" fmla="*/ 0 h 2310480"/>
-              <a:gd name="textAreaBottom" fmla="*/ 2310840 h 2310480"/>
+              <a:gd name="textAreaLeft" fmla="*/ 0 w 4800240"/>
+              <a:gd name="textAreaRight" fmla="*/ 4800960 w 4800240"/>
+              <a:gd name="textAreaTop" fmla="*/ 0 h 2310120"/>
+              <a:gd name="textAreaBottom" fmla="*/ 2310840 h 2310120"/>
             </a:gdLst>
             <a:ahLst/>
             <a:rect l="textAreaLeft" t="textAreaTop" r="textAreaRight" b="textAreaBottom"/>
@@ -4000,22 +3837,22 @@
       </p:sp>
       <p:sp>
         <p:nvSpPr>
-          <p:cNvPr id="74" name="Connection Line"/>
+          <p:cNvPr id="65" name="Connection Line"/>
           <p:cNvSpPr/>
           <p:nvPr/>
         </p:nvSpPr>
         <p:spPr>
           <a:xfrm>
-            <a:off x="8949240" y="6597360"/>
-            <a:ext cx="2208240" cy="1670040"/>
+            <a:off x="8001000" y="6629400"/>
+            <a:ext cx="3156120" cy="1637640"/>
           </a:xfrm>
           <a:custGeom>
             <a:avLst/>
             <a:gdLst>
-              <a:gd name="textAreaLeft" fmla="*/ 0 w 2208240"/>
-              <a:gd name="textAreaRight" fmla="*/ 2208600 w 2208240"/>
-              <a:gd name="textAreaTop" fmla="*/ 0 h 1670040"/>
-              <a:gd name="textAreaBottom" fmla="*/ 1670400 h 1670040"/>
+              <a:gd name="textAreaLeft" fmla="*/ 0 w 3156120"/>
+              <a:gd name="textAreaRight" fmla="*/ 3156840 w 3156120"/>
+              <a:gd name="textAreaTop" fmla="*/ 0 h 1637640"/>
+              <a:gd name="textAreaBottom" fmla="*/ 1638000 h 1637640"/>
             </a:gdLst>
             <a:ahLst/>
             <a:rect l="textAreaLeft" t="textAreaTop" r="textAreaRight" b="textAreaBottom"/>
@@ -4072,14 +3909,14 @@
       </p:sp>
       <p:sp>
         <p:nvSpPr>
-          <p:cNvPr id="75" name="NP constraints"/>
+          <p:cNvPr id="66" name="NP constraints"/>
           <p:cNvSpPr/>
           <p:nvPr/>
         </p:nvSpPr>
         <p:spPr>
           <a:xfrm>
             <a:off x="15310800" y="771120"/>
-            <a:ext cx="1783440" cy="378000"/>
+            <a:ext cx="1783080" cy="377640"/>
           </a:xfrm>
           <a:prstGeom prst="rect">
             <a:avLst/>
@@ -4129,14 +3966,14 @@
       </p:sp>
       <p:sp>
         <p:nvSpPr>
-          <p:cNvPr id="76" name="rateParams"/>
+          <p:cNvPr id="67" name="rateParams"/>
           <p:cNvSpPr/>
           <p:nvPr/>
         </p:nvSpPr>
         <p:spPr>
           <a:xfrm>
-            <a:off x="10656720" y="5694480"/>
-            <a:ext cx="1429560" cy="378000"/>
+            <a:off x="9257400" y="5282640"/>
+            <a:ext cx="1429200" cy="377640"/>
           </a:xfrm>
           <a:prstGeom prst="rect">
             <a:avLst/>
@@ -4186,14 +4023,14 @@
       </p:sp>
       <p:sp>
         <p:nvSpPr>
-          <p:cNvPr id="77" name="Asymmetric log-normal"/>
+          <p:cNvPr id="68" name="Asymmetric log-normal"/>
           <p:cNvSpPr/>
           <p:nvPr/>
         </p:nvSpPr>
         <p:spPr>
           <a:xfrm>
-            <a:off x="6244200" y="5240520"/>
-            <a:ext cx="2835720" cy="378000"/>
+            <a:off x="5416200" y="5240520"/>
+            <a:ext cx="2835360" cy="377640"/>
           </a:xfrm>
           <a:prstGeom prst="rect">
             <a:avLst/>
@@ -4243,14 +4080,14 @@
       </p:sp>
       <p:sp>
         <p:nvSpPr>
-          <p:cNvPr id="78" name="Log-normal"/>
+          <p:cNvPr id="69" name="Log-normal"/>
           <p:cNvSpPr/>
           <p:nvPr/>
         </p:nvSpPr>
         <p:spPr>
           <a:xfrm>
-            <a:off x="4436640" y="5240520"/>
-            <a:ext cx="1464480" cy="378000"/>
+            <a:off x="3464640" y="5240520"/>
+            <a:ext cx="1464120" cy="377640"/>
           </a:xfrm>
           <a:prstGeom prst="rect">
             <a:avLst/>
@@ -4300,14 +4137,14 @@
       </p:sp>
       <p:sp>
         <p:nvSpPr>
-          <p:cNvPr id="79" name="Gamma"/>
+          <p:cNvPr id="70" name="Gamma"/>
           <p:cNvSpPr/>
           <p:nvPr/>
         </p:nvSpPr>
         <p:spPr>
           <a:xfrm>
-            <a:off x="2826000" y="5240520"/>
-            <a:ext cx="1017360" cy="378000"/>
+            <a:off x="1890000" y="5312520"/>
+            <a:ext cx="1017000" cy="377640"/>
           </a:xfrm>
           <a:prstGeom prst="rect">
             <a:avLst/>
@@ -4357,14 +4194,14 @@
       </p:sp>
       <p:sp>
         <p:nvSpPr>
-          <p:cNvPr id="80" name="Physics model scaling"/>
+          <p:cNvPr id="71" name="Physics model scaling"/>
           <p:cNvSpPr/>
           <p:nvPr/>
         </p:nvSpPr>
         <p:spPr>
           <a:xfrm>
-            <a:off x="9427680" y="3696120"/>
-            <a:ext cx="2051280" cy="695880"/>
+            <a:off x="9031680" y="3768120"/>
+            <a:ext cx="2050920" cy="695520"/>
           </a:xfrm>
           <a:prstGeom prst="rect">
             <a:avLst/>
@@ -4414,14 +4251,14 @@
       </p:sp>
       <p:sp>
         <p:nvSpPr>
-          <p:cNvPr id="81" name="Process templates"/>
+          <p:cNvPr id="72" name="Process templates"/>
           <p:cNvSpPr/>
           <p:nvPr/>
         </p:nvSpPr>
         <p:spPr>
           <a:xfrm>
-            <a:off x="12997080" y="3695760"/>
-            <a:ext cx="2253240" cy="378000"/>
+            <a:off x="13984560" y="3713760"/>
+            <a:ext cx="2252880" cy="377640"/>
           </a:xfrm>
           <a:prstGeom prst="rect">
             <a:avLst/>
@@ -4471,14 +4308,14 @@
       </p:sp>
       <p:sp>
         <p:nvSpPr>
-          <p:cNvPr id="82" name="Process norm."/>
+          <p:cNvPr id="73" name="Process norm."/>
           <p:cNvSpPr/>
           <p:nvPr/>
         </p:nvSpPr>
         <p:spPr>
           <a:xfrm>
             <a:off x="11135520" y="3696120"/>
-            <a:ext cx="2051280" cy="377640"/>
+            <a:ext cx="2050920" cy="377280"/>
           </a:xfrm>
           <a:prstGeom prst="rect">
             <a:avLst/>
@@ -4528,14 +4365,14 @@
       </p:sp>
       <p:sp>
         <p:nvSpPr>
-          <p:cNvPr id="83" name="MC stats"/>
+          <p:cNvPr id="74" name="MC stats"/>
           <p:cNvSpPr/>
           <p:nvPr/>
         </p:nvSpPr>
         <p:spPr>
           <a:xfrm>
-            <a:off x="15406920" y="3714120"/>
-            <a:ext cx="2051280" cy="378000"/>
+            <a:off x="16414920" y="3786120"/>
+            <a:ext cx="2050920" cy="377640"/>
           </a:xfrm>
           <a:prstGeom prst="rect">
             <a:avLst/>
@@ -4585,14 +4422,14 @@
       </p:sp>
       <p:sp>
         <p:nvSpPr>
-          <p:cNvPr id="84" name="Barlow-Beeston"/>
+          <p:cNvPr id="75" name="Barlow-Beeston"/>
           <p:cNvSpPr/>
           <p:nvPr/>
         </p:nvSpPr>
         <p:spPr>
           <a:xfrm>
-            <a:off x="17161920" y="3989880"/>
-            <a:ext cx="2050920" cy="378000"/>
+            <a:off x="16945920" y="4529880"/>
+            <a:ext cx="2050560" cy="377640"/>
           </a:xfrm>
           <a:prstGeom prst="rect">
             <a:avLst/>
@@ -4642,14 +4479,14 @@
       </p:sp>
       <p:sp>
         <p:nvSpPr>
-          <p:cNvPr id="85" name="&quot;lite&quot;"/>
+          <p:cNvPr id="76" name="&quot;lite&quot;"/>
           <p:cNvSpPr/>
           <p:nvPr/>
         </p:nvSpPr>
         <p:spPr>
           <a:xfrm>
-            <a:off x="17161920" y="4483800"/>
-            <a:ext cx="2050920" cy="377640"/>
+            <a:off x="16945920" y="5023800"/>
+            <a:ext cx="2050560" cy="377280"/>
           </a:xfrm>
           <a:prstGeom prst="rect">
             <a:avLst/>
@@ -4699,14 +4536,14 @@
       </p:sp>
       <p:sp>
         <p:nvSpPr>
-          <p:cNvPr id="86" name="full"/>
+          <p:cNvPr id="77" name="full"/>
           <p:cNvSpPr/>
           <p:nvPr/>
         </p:nvSpPr>
         <p:spPr>
           <a:xfrm>
-            <a:off x="16107120" y="5236560"/>
-            <a:ext cx="2051280" cy="378000"/>
+            <a:off x="15891120" y="5776560"/>
+            <a:ext cx="2050920" cy="377640"/>
           </a:xfrm>
           <a:prstGeom prst="rect">
             <a:avLst/>
@@ -4756,14 +4593,14 @@
       </p:sp>
       <p:sp>
         <p:nvSpPr>
-          <p:cNvPr id="87" name="Shape uncert. norm. change factored out"/>
+          <p:cNvPr id="78" name="Shape uncert. norm. change factored out"/>
           <p:cNvSpPr/>
           <p:nvPr/>
         </p:nvSpPr>
         <p:spPr>
           <a:xfrm>
             <a:off x="10517400" y="9482760"/>
-            <a:ext cx="2835720" cy="696240"/>
+            <a:ext cx="2835360" cy="695880"/>
           </a:xfrm>
           <a:prstGeom prst="rect">
             <a:avLst/>
@@ -4813,14 +4650,14 @@
       </p:sp>
       <p:sp>
         <p:nvSpPr>
-          <p:cNvPr id="88" name="Interpolation between up and down variations (norm)"/>
+          <p:cNvPr id="79" name="Interpolation between up and down variations (norm)"/>
           <p:cNvSpPr/>
           <p:nvPr/>
         </p:nvSpPr>
         <p:spPr>
           <a:xfrm>
             <a:off x="970920" y="9378000"/>
-            <a:ext cx="6420600" cy="378000"/>
+            <a:ext cx="6420240" cy="377640"/>
           </a:xfrm>
           <a:prstGeom prst="rect">
             <a:avLst/>
@@ -4870,14 +4707,14 @@
       </p:sp>
       <p:sp>
         <p:nvSpPr>
-          <p:cNvPr id="89" name="Interpolation between up and down variations (shape)"/>
+          <p:cNvPr id="80" name="Interpolation between up and down variations (shape)"/>
           <p:cNvSpPr/>
           <p:nvPr/>
         </p:nvSpPr>
         <p:spPr>
           <a:xfrm>
             <a:off x="5031000" y="12533400"/>
-            <a:ext cx="6531120" cy="378000"/>
+            <a:ext cx="6530760" cy="377640"/>
           </a:xfrm>
           <a:prstGeom prst="rect">
             <a:avLst/>
@@ -4927,33 +4764,33 @@
       </p:sp>
       <p:grpSp>
         <p:nvGrpSpPr>
-          <p:cNvPr id="90" name="Group"/>
+          <p:cNvPr id="81" name="Group"/>
           <p:cNvGrpSpPr/>
           <p:nvPr/>
         </p:nvGrpSpPr>
         <p:grpSpPr>
           <a:xfrm>
-            <a:off x="17778960" y="9082800"/>
-            <a:ext cx="5776560" cy="1125720"/>
-            <a:chOff x="17778960" y="9082800"/>
-            <a:chExt cx="5776560" cy="1125720"/>
+            <a:off x="3843000" y="9118800"/>
+            <a:ext cx="19208160" cy="1932840"/>
+            <a:chOff x="3843000" y="9118800"/>
+            <a:chExt cx="19208160" cy="1932840"/>
           </a:xfrm>
         </p:grpSpPr>
         <p:pic>
           <p:nvPicPr>
-            <p:cNvPr id="91" name="Image" descr="Image"/>
+            <p:cNvPr id="82" name="Image" descr="Image"/>
             <p:cNvPicPr/>
             <p:nvPr/>
           </p:nvPicPr>
           <p:blipFill>
-            <a:blip r:embed="rId10"/>
+            <a:blip r:embed="rId1"/>
             <a:srcRect l="0" t="7367" r="0" b="0"/>
             <a:stretch/>
           </p:blipFill>
           <p:spPr>
             <a:xfrm>
-              <a:off x="17804160" y="9082800"/>
-              <a:ext cx="2309760" cy="518400"/>
+              <a:off x="17300160" y="9118800"/>
+              <a:ext cx="2309400" cy="518040"/>
             </a:xfrm>
             <a:prstGeom prst="rect">
               <a:avLst/>
@@ -4965,18 +4802,18 @@
         </p:pic>
         <p:pic>
           <p:nvPicPr>
-            <p:cNvPr id="92" name="Image" descr="Image"/>
+            <p:cNvPr id="83" name="Image" descr="Image"/>
             <p:cNvPicPr/>
             <p:nvPr/>
           </p:nvPicPr>
           <p:blipFill>
-            <a:blip r:embed="rId11"/>
+            <a:blip r:embed="rId2"/>
             <a:stretch/>
           </p:blipFill>
           <p:spPr>
             <a:xfrm>
-              <a:off x="17778960" y="9747000"/>
-              <a:ext cx="5776560" cy="428760"/>
+              <a:off x="17274960" y="9783000"/>
+              <a:ext cx="5776200" cy="428400"/>
             </a:xfrm>
             <a:prstGeom prst="rect">
               <a:avLst/>
@@ -4988,14 +4825,14 @@
         </p:pic>
         <p:sp>
           <p:nvSpPr>
-            <p:cNvPr id="93" name="Rectangle"/>
+            <p:cNvPr id="84" name="Rectangle"/>
             <p:cNvSpPr/>
             <p:nvPr/>
           </p:nvSpPr>
           <p:spPr>
             <a:xfrm>
-              <a:off x="17788680" y="9741240"/>
-              <a:ext cx="303120" cy="453600"/>
+              <a:off x="17284680" y="9777240"/>
+              <a:ext cx="302760" cy="453240"/>
             </a:xfrm>
             <a:prstGeom prst="rect">
               <a:avLst/>
@@ -5040,14 +4877,14 @@
         </p:sp>
         <p:sp>
           <p:nvSpPr>
-            <p:cNvPr id="94" name="Rectangle"/>
+            <p:cNvPr id="85" name="Rectangle"/>
             <p:cNvSpPr/>
             <p:nvPr/>
           </p:nvSpPr>
           <p:spPr>
             <a:xfrm>
-              <a:off x="17893080" y="9101520"/>
-              <a:ext cx="303120" cy="453600"/>
+              <a:off x="17389080" y="9137520"/>
+              <a:ext cx="302760" cy="453240"/>
             </a:xfrm>
             <a:prstGeom prst="rect">
               <a:avLst/>
@@ -5092,14 +4929,14 @@
         </p:sp>
         <p:sp>
           <p:nvSpPr>
-            <p:cNvPr id="95" name="Rectangle"/>
+            <p:cNvPr id="86" name="Rectangle"/>
             <p:cNvSpPr/>
             <p:nvPr/>
           </p:nvSpPr>
           <p:spPr>
             <a:xfrm>
-              <a:off x="18975240" y="9747720"/>
-              <a:ext cx="303120" cy="453600"/>
+              <a:off x="18471240" y="9783720"/>
+              <a:ext cx="302760" cy="453240"/>
             </a:xfrm>
             <a:prstGeom prst="rect">
               <a:avLst/>
@@ -5144,14 +4981,14 @@
         </p:sp>
         <p:sp>
           <p:nvSpPr>
-            <p:cNvPr id="96" name="Rectangle"/>
+            <p:cNvPr id="87" name="Rectangle"/>
             <p:cNvSpPr/>
             <p:nvPr/>
           </p:nvSpPr>
           <p:spPr>
             <a:xfrm>
-              <a:off x="21047760" y="9755280"/>
-              <a:ext cx="392760" cy="453240"/>
+              <a:off x="20543760" y="9791280"/>
+              <a:ext cx="392400" cy="452880"/>
             </a:xfrm>
             <a:prstGeom prst="rect">
               <a:avLst/>
@@ -5194,17 +5031,40 @@
             </a:p>
           </p:txBody>
         </p:sp>
+        <p:pic>
+          <p:nvPicPr>
+            <p:cNvPr id="88" name="" descr=""/>
+            <p:cNvPicPr/>
+            <p:nvPr/>
+          </p:nvPicPr>
+          <p:blipFill>
+            <a:blip r:embed="rId3"/>
+            <a:stretch/>
+          </p:blipFill>
+          <p:spPr>
+            <a:xfrm>
+              <a:off x="3843000" y="9495360"/>
+              <a:ext cx="3816360" cy="1556280"/>
+            </a:xfrm>
+            <a:prstGeom prst="rect">
+              <a:avLst/>
+            </a:prstGeom>
+            <a:ln w="0">
+              <a:noFill/>
+            </a:ln>
+          </p:spPr>
+        </p:pic>
       </p:grpSp>
       <p:sp>
         <p:nvSpPr>
-          <p:cNvPr id="97" name="Rectangle"/>
+          <p:cNvPr id="89" name="Rectangle"/>
           <p:cNvSpPr/>
           <p:nvPr/>
         </p:nvSpPr>
         <p:spPr>
           <a:xfrm>
-            <a:off x="848160" y="8382240"/>
-            <a:ext cx="1422000" cy="654840"/>
+            <a:off x="544320" y="8489520"/>
+            <a:ext cx="1741680" cy="654480"/>
           </a:xfrm>
           <a:prstGeom prst="rect">
             <a:avLst/>
@@ -5249,22 +5109,22 @@
       </p:sp>
       <p:sp>
         <p:nvSpPr>
-          <p:cNvPr id="98" name="Connection Line"/>
+          <p:cNvPr id="90" name="Connection Line"/>
           <p:cNvSpPr/>
           <p:nvPr/>
         </p:nvSpPr>
         <p:spPr>
           <a:xfrm>
             <a:off x="12727800" y="8390160"/>
-            <a:ext cx="1218600" cy="334440"/>
+            <a:ext cx="1218240" cy="334080"/>
           </a:xfrm>
           <a:custGeom>
             <a:avLst/>
             <a:gdLst>
-              <a:gd name="textAreaLeft" fmla="*/ 0 w 1218600"/>
-              <a:gd name="textAreaRight" fmla="*/ 1218960 w 1218600"/>
-              <a:gd name="textAreaTop" fmla="*/ 0 h 334440"/>
-              <a:gd name="textAreaBottom" fmla="*/ 334800 h 334440"/>
+              <a:gd name="textAreaLeft" fmla="*/ 0 w 1218240"/>
+              <a:gd name="textAreaRight" fmla="*/ 1218960 w 1218240"/>
+              <a:gd name="textAreaTop" fmla="*/ 0 h 334080"/>
+              <a:gd name="textAreaBottom" fmla="*/ 334800 h 334080"/>
             </a:gdLst>
             <a:ahLst/>
             <a:rect l="textAreaLeft" t="textAreaTop" r="textAreaRight" b="textAreaBottom"/>
@@ -5321,14 +5181,14 @@
       </p:sp>
       <p:sp>
         <p:nvSpPr>
-          <p:cNvPr id="99" name="Rectangle"/>
+          <p:cNvPr id="91" name="Rectangle"/>
           <p:cNvSpPr/>
           <p:nvPr/>
         </p:nvSpPr>
         <p:spPr>
           <a:xfrm>
             <a:off x="5079600" y="11558160"/>
-            <a:ext cx="1434960" cy="360000"/>
+            <a:ext cx="1434600" cy="359640"/>
           </a:xfrm>
           <a:prstGeom prst="rect">
             <a:avLst/>
@@ -5373,14 +5233,14 @@
       </p:sp>
       <p:sp>
         <p:nvSpPr>
-          <p:cNvPr id="100" name="Rectangle"/>
+          <p:cNvPr id="92" name="Rectangle"/>
           <p:cNvSpPr/>
           <p:nvPr/>
         </p:nvSpPr>
         <p:spPr>
           <a:xfrm>
-            <a:off x="17991360" y="4646160"/>
-            <a:ext cx="807480" cy="561960"/>
+            <a:off x="17775360" y="5186160"/>
+            <a:ext cx="807120" cy="561600"/>
           </a:xfrm>
           <a:prstGeom prst="rect">
             <a:avLst/>
@@ -5425,14 +5285,14 @@
       </p:sp>
       <p:sp>
         <p:nvSpPr>
-          <p:cNvPr id="101" name="Rectangle"/>
+          <p:cNvPr id="93" name="Rectangle"/>
           <p:cNvSpPr/>
           <p:nvPr/>
         </p:nvSpPr>
         <p:spPr>
           <a:xfrm>
-            <a:off x="16107120" y="5646960"/>
-            <a:ext cx="807120" cy="562320"/>
+            <a:off x="15891120" y="6186960"/>
+            <a:ext cx="806760" cy="561960"/>
           </a:xfrm>
           <a:prstGeom prst="rect">
             <a:avLst/>
@@ -5477,14 +5337,14 @@
       </p:sp>
       <p:sp>
         <p:nvSpPr>
-          <p:cNvPr id="102" name="Rectangle"/>
+          <p:cNvPr id="94" name="Rectangle"/>
           <p:cNvSpPr/>
           <p:nvPr/>
         </p:nvSpPr>
         <p:spPr>
           <a:xfrm>
-            <a:off x="1964160" y="5674680"/>
-            <a:ext cx="520560" cy="675000"/>
+            <a:off x="956160" y="5638680"/>
+            <a:ext cx="520200" cy="674640"/>
           </a:xfrm>
           <a:prstGeom prst="rect">
             <a:avLst/>
@@ -5529,22 +5389,22 @@
       </p:sp>
       <p:sp>
         <p:nvSpPr>
-          <p:cNvPr id="103" name="Connection Line"/>
+          <p:cNvPr id="95" name="Connection Line"/>
           <p:cNvSpPr/>
           <p:nvPr/>
         </p:nvSpPr>
         <p:spPr>
           <a:xfrm>
-            <a:off x="2911680" y="6342480"/>
-            <a:ext cx="314640" cy="599040"/>
+            <a:off x="2191680" y="6342480"/>
+            <a:ext cx="314280" cy="598680"/>
           </a:xfrm>
           <a:custGeom>
             <a:avLst/>
             <a:gdLst>
-              <a:gd name="textAreaLeft" fmla="*/ 0 w 314640"/>
-              <a:gd name="textAreaRight" fmla="*/ 315000 w 314640"/>
-              <a:gd name="textAreaTop" fmla="*/ 0 h 599040"/>
-              <a:gd name="textAreaBottom" fmla="*/ 599400 h 599040"/>
+              <a:gd name="textAreaLeft" fmla="*/ 0 w 314280"/>
+              <a:gd name="textAreaRight" fmla="*/ 315000 w 314280"/>
+              <a:gd name="textAreaTop" fmla="*/ 0 h 598680"/>
+              <a:gd name="textAreaBottom" fmla="*/ 599400 h 598680"/>
             </a:gdLst>
             <a:ahLst/>
             <a:rect l="textAreaLeft" t="textAreaTop" r="textAreaRight" b="textAreaBottom"/>
@@ -5601,18 +5461,18 @@
       </p:sp>
       <p:pic>
         <p:nvPicPr>
-          <p:cNvPr id="104" name="Image" descr="Image"/>
+          <p:cNvPr id="96" name="Image" descr="Image"/>
           <p:cNvPicPr/>
           <p:nvPr/>
         </p:nvPicPr>
         <p:blipFill>
-          <a:blip r:embed="rId12"/>
+          <a:blip r:embed="rId4"/>
           <a:stretch/>
         </p:blipFill>
         <p:spPr>
           <a:xfrm>
-            <a:off x="1808280" y="6881760"/>
-            <a:ext cx="1103400" cy="509040"/>
+            <a:off x="1088280" y="6881760"/>
+            <a:ext cx="1103040" cy="508680"/>
           </a:xfrm>
           <a:prstGeom prst="rect">
             <a:avLst/>
@@ -5624,22 +5484,22 @@
       </p:pic>
       <p:sp>
         <p:nvSpPr>
-          <p:cNvPr id="105" name="Connection Line"/>
+          <p:cNvPr id="97" name="Connection Line"/>
           <p:cNvSpPr/>
           <p:nvPr/>
         </p:nvSpPr>
         <p:spPr>
           <a:xfrm>
             <a:off x="2971800" y="6521400"/>
-            <a:ext cx="4116600" cy="1681200"/>
+            <a:ext cx="4116240" cy="1680840"/>
           </a:xfrm>
           <a:custGeom>
             <a:avLst/>
             <a:gdLst>
-              <a:gd name="textAreaLeft" fmla="*/ 0 w 4116600"/>
-              <a:gd name="textAreaRight" fmla="*/ 4116960 w 4116600"/>
-              <a:gd name="textAreaTop" fmla="*/ 0 h 1681200"/>
-              <a:gd name="textAreaBottom" fmla="*/ 1681560 h 1681200"/>
+              <a:gd name="textAreaLeft" fmla="*/ 0 w 4116240"/>
+              <a:gd name="textAreaRight" fmla="*/ 4116960 w 4116240"/>
+              <a:gd name="textAreaTop" fmla="*/ 0 h 1680840"/>
+              <a:gd name="textAreaBottom" fmla="*/ 1681560 h 1680840"/>
             </a:gdLst>
             <a:ahLst/>
             <a:rect l="textAreaLeft" t="textAreaTop" r="textAreaRight" b="textAreaBottom"/>
@@ -5696,22 +5556,22 @@
       </p:sp>
       <p:sp>
         <p:nvSpPr>
-          <p:cNvPr id="106" name="Connection Line 1"/>
+          <p:cNvPr id="98" name="Connection Line 1"/>
           <p:cNvSpPr/>
           <p:nvPr/>
         </p:nvSpPr>
         <p:spPr>
           <a:xfrm>
-            <a:off x="11802960" y="4073760"/>
-            <a:ext cx="771840" cy="1998720"/>
+            <a:off x="10827000" y="4179600"/>
+            <a:ext cx="771480" cy="1998360"/>
           </a:xfrm>
           <a:custGeom>
             <a:avLst/>
             <a:gdLst>
-              <a:gd name="textAreaLeft" fmla="*/ 0 w 771840"/>
-              <a:gd name="textAreaRight" fmla="*/ 772200 w 771840"/>
-              <a:gd name="textAreaTop" fmla="*/ 0 h 1998720"/>
-              <a:gd name="textAreaBottom" fmla="*/ 1999080 h 1998720"/>
+              <a:gd name="textAreaLeft" fmla="*/ 0 w 771480"/>
+              <a:gd name="textAreaRight" fmla="*/ 772200 w 771480"/>
+              <a:gd name="textAreaTop" fmla="*/ 0 h 1998360"/>
+              <a:gd name="textAreaBottom" fmla="*/ 1999080 h 1998360"/>
             </a:gdLst>
             <a:ahLst/>
             <a:rect l="textAreaLeft" t="textAreaTop" r="textAreaRight" b="textAreaBottom"/>
@@ -5748,6 +5608,11 @@
             <a:noAutofit/>
           </a:bodyPr>
           <a:p>
+            <a:pPr>
+              <a:lnSpc>
+                <a:spcPct val="100000"/>
+              </a:lnSpc>
+            </a:pPr>
             <a:endParaRPr b="1" lang="en-US" sz="3000" spc="-1" strike="noStrike">
               <a:solidFill>
                 <a:srgbClr val="000000"/>
@@ -5760,22 +5625,22 @@
       </p:sp>
       <p:sp>
         <p:nvSpPr>
-          <p:cNvPr id="107" name="Connection Line 2"/>
+          <p:cNvPr id="99" name="Connection Line 2"/>
           <p:cNvSpPr/>
           <p:nvPr/>
         </p:nvSpPr>
         <p:spPr>
           <a:xfrm>
             <a:off x="14174640" y="4302360"/>
-            <a:ext cx="360" cy="3180240"/>
+            <a:ext cx="360" cy="3179880"/>
           </a:xfrm>
           <a:custGeom>
             <a:avLst/>
             <a:gdLst>
               <a:gd name="textAreaLeft" fmla="*/ 0 w 360"/>
-              <a:gd name="textAreaRight" fmla="*/ 720 w 360"/>
-              <a:gd name="textAreaTop" fmla="*/ 0 h 3180240"/>
-              <a:gd name="textAreaBottom" fmla="*/ 3180600 h 3180240"/>
+              <a:gd name="textAreaRight" fmla="*/ 1440 w 360"/>
+              <a:gd name="textAreaTop" fmla="*/ 0 h 3179880"/>
+              <a:gd name="textAreaBottom" fmla="*/ 3180600 h 3179880"/>
             </a:gdLst>
             <a:ahLst/>
             <a:rect l="textAreaLeft" t="textAreaTop" r="textAreaRight" b="textAreaBottom"/>
@@ -5812,6 +5677,11 @@
             <a:noAutofit/>
           </a:bodyPr>
           <a:p>
+            <a:pPr>
+              <a:lnSpc>
+                <a:spcPct val="100000"/>
+              </a:lnSpc>
+            </a:pPr>
             <a:endParaRPr b="1" lang="en-US" sz="3000" spc="-1" strike="noStrike">
               <a:solidFill>
                 <a:srgbClr val="000000"/>
@@ -5824,22 +5694,22 @@
       </p:sp>
       <p:sp>
         <p:nvSpPr>
-          <p:cNvPr id="108" name="Connection Line 3"/>
+          <p:cNvPr id="100" name="Connection Line 3"/>
           <p:cNvSpPr/>
           <p:nvPr/>
         </p:nvSpPr>
         <p:spPr>
           <a:xfrm flipH="1">
-            <a:off x="16794360" y="3159720"/>
-            <a:ext cx="1495080" cy="847080"/>
+            <a:off x="17601840" y="3886200"/>
+            <a:ext cx="228600" cy="643680"/>
           </a:xfrm>
           <a:custGeom>
             <a:avLst/>
             <a:gdLst>
-              <a:gd name="textAreaLeft" fmla="*/ -360 w 1495080"/>
-              <a:gd name="textAreaRight" fmla="*/ 1495080 w 1495080"/>
-              <a:gd name="textAreaTop" fmla="*/ 0 h 847080"/>
-              <a:gd name="textAreaBottom" fmla="*/ 847440 h 847080"/>
+              <a:gd name="textAreaLeft" fmla="*/ -360 w 228600"/>
+              <a:gd name="textAreaRight" fmla="*/ 228600 w 228600"/>
+              <a:gd name="textAreaTop" fmla="*/ 0 h 643680"/>
+              <a:gd name="textAreaBottom" fmla="*/ 644040 h 643680"/>
             </a:gdLst>
             <a:ahLst/>
             <a:rect l="textAreaLeft" t="textAreaTop" r="textAreaRight" b="textAreaBottom"/>
@@ -5876,6 +5746,11 @@
             <a:noAutofit/>
           </a:bodyPr>
           <a:p>
+            <a:pPr>
+              <a:lnSpc>
+                <a:spcPct val="100000"/>
+              </a:lnSpc>
+            </a:pPr>
             <a:endParaRPr b="1" lang="en-US" sz="3000" spc="-1" strike="noStrike">
               <a:solidFill>
                 <a:srgbClr val="000000"/>
@@ -5888,14 +5763,14 @@
       </p:sp>
       <p:sp>
         <p:nvSpPr>
-          <p:cNvPr id="109" name="Rectangle 1"/>
+          <p:cNvPr id="101" name="Rectangle 1"/>
           <p:cNvSpPr/>
           <p:nvPr/>
         </p:nvSpPr>
         <p:spPr>
           <a:xfrm>
-            <a:off x="17490600" y="7702560"/>
-            <a:ext cx="287640" cy="324000"/>
+            <a:off x="17706600" y="7702560"/>
+            <a:ext cx="287280" cy="323640"/>
           </a:xfrm>
           <a:prstGeom prst="rect">
             <a:avLst/>
@@ -5920,9 +5795,705 @@
             <a:noAutofit/>
           </a:bodyPr>
           <a:p>
+            <a:pPr>
+              <a:lnSpc>
+                <a:spcPct val="100000"/>
+              </a:lnSpc>
+            </a:pPr>
             <a:endParaRPr b="0" lang="en-US" sz="3200" spc="-1" strike="noStrike">
               <a:solidFill>
                 <a:srgbClr val="011993"/>
+              </a:solidFill>
+              <a:latin typeface="Myriad Pro"/>
+              <a:ea typeface="Myriad Pro"/>
+            </a:endParaRPr>
+          </a:p>
+        </p:txBody>
+      </p:sp>
+      <p:sp>
+        <p:nvSpPr>
+          <p:cNvPr id="102" name="Connection Line 4"/>
+          <p:cNvSpPr/>
+          <p:nvPr/>
+        </p:nvSpPr>
+        <p:spPr>
+          <a:xfrm flipH="1">
+            <a:off x="16966080" y="915120"/>
+            <a:ext cx="1494720" cy="456480"/>
+          </a:xfrm>
+          <a:custGeom>
+            <a:avLst/>
+            <a:gdLst>
+              <a:gd name="textAreaLeft" fmla="*/ -360 w 1494720"/>
+              <a:gd name="textAreaRight" fmla="*/ 1495080 w 1494720"/>
+              <a:gd name="textAreaTop" fmla="*/ 0 h 456480"/>
+              <a:gd name="textAreaBottom" fmla="*/ 456840 h 456480"/>
+            </a:gdLst>
+            <a:ahLst/>
+            <a:rect l="textAreaLeft" t="textAreaTop" r="textAreaRight" b="textAreaBottom"/>
+            <a:pathLst>
+              <a:path w="21484" h="21600">
+                <a:moveTo>
+                  <a:pt x="2" y="21600"/>
+                </a:moveTo>
+                <a:cubicBezTo>
+                  <a:pt x="-116" y="9842"/>
+                  <a:pt x="7045" y="2642"/>
+                  <a:pt x="21484" y="0"/>
+                </a:cubicBezTo>
+              </a:path>
+            </a:pathLst>
+          </a:custGeom>
+          <a:noFill/>
+          <a:ln w="50800">
+            <a:solidFill>
+              <a:srgbClr val="000000"/>
+            </a:solidFill>
+            <a:miter/>
+            <a:headEnd len="med" type="triangle" w="med"/>
+          </a:ln>
+        </p:spPr>
+        <p:style>
+          <a:lnRef idx="0"/>
+          <a:fillRef idx="0"/>
+          <a:effectRef idx="0"/>
+          <a:fontRef idx="minor"/>
+        </p:style>
+        <p:txBody>
+          <a:bodyPr lIns="90000" rIns="90000" tIns="45000" bIns="45000" anchor="t">
+            <a:noAutofit/>
+          </a:bodyPr>
+          <a:p>
+            <a:endParaRPr b="1" lang="en-US" sz="3000" spc="-1" strike="noStrike">
+              <a:solidFill>
+                <a:srgbClr val="000000"/>
+              </a:solidFill>
+              <a:latin typeface="Helvetica Neue"/>
+              <a:ea typeface="Helvetica Neue"/>
+            </a:endParaRPr>
+          </a:p>
+        </p:txBody>
+      </p:sp>
+      <p:sp>
+        <p:nvSpPr>
+          <p:cNvPr id="103" name="Rectangle 2"/>
+          <p:cNvSpPr/>
+          <p:nvPr/>
+        </p:nvSpPr>
+        <p:spPr>
+          <a:xfrm>
+            <a:off x="18288000" y="1371600"/>
+            <a:ext cx="685800" cy="654480"/>
+          </a:xfrm>
+          <a:prstGeom prst="rect">
+            <a:avLst/>
+          </a:prstGeom>
+          <a:solidFill>
+            <a:srgbClr val="009051">
+              <a:alpha val="28000"/>
+            </a:srgbClr>
+          </a:solidFill>
+          <a:ln w="12700">
+            <a:noFill/>
+          </a:ln>
+        </p:spPr>
+        <p:style>
+          <a:lnRef idx="0"/>
+          <a:fillRef idx="0"/>
+          <a:effectRef idx="0"/>
+          <a:fontRef idx="minor"/>
+        </p:style>
+        <p:txBody>
+          <a:bodyPr lIns="71280" rIns="71280" tIns="71280" bIns="71280" anchor="ctr">
+            <a:noAutofit/>
+          </a:bodyPr>
+          <a:p>
+            <a:endParaRPr b="0" lang="en-US" sz="3200" spc="-1" strike="noStrike">
+              <a:solidFill>
+                <a:srgbClr val="000000"/>
+              </a:solidFill>
+              <a:latin typeface="Myriad Pro"/>
+              <a:ea typeface="Myriad Pro"/>
+            </a:endParaRPr>
+          </a:p>
+        </p:txBody>
+      </p:sp>
+      <p:sp>
+        <p:nvSpPr>
+          <p:cNvPr id="104" name="Rectangle 3"/>
+          <p:cNvSpPr/>
+          <p:nvPr/>
+        </p:nvSpPr>
+        <p:spPr>
+          <a:xfrm>
+            <a:off x="18516600" y="2127600"/>
+            <a:ext cx="493200" cy="615600"/>
+          </a:xfrm>
+          <a:prstGeom prst="rect">
+            <a:avLst/>
+          </a:prstGeom>
+          <a:solidFill>
+            <a:srgbClr val="009051">
+              <a:alpha val="28000"/>
+            </a:srgbClr>
+          </a:solidFill>
+          <a:ln w="12700">
+            <a:noFill/>
+          </a:ln>
+        </p:spPr>
+        <p:style>
+          <a:lnRef idx="0"/>
+          <a:fillRef idx="0"/>
+          <a:effectRef idx="0"/>
+          <a:fontRef idx="minor"/>
+        </p:style>
+        <p:txBody>
+          <a:bodyPr lIns="71280" rIns="71280" tIns="71280" bIns="71280" anchor="ctr">
+            <a:noAutofit/>
+          </a:bodyPr>
+          <a:p>
+            <a:endParaRPr b="0" lang="en-US" sz="3200" spc="-1" strike="noStrike">
+              <a:solidFill>
+                <a:srgbClr val="000000"/>
+              </a:solidFill>
+              <a:latin typeface="Myriad Pro"/>
+              <a:ea typeface="Myriad Pro"/>
+            </a:endParaRPr>
+          </a:p>
+        </p:txBody>
+      </p:sp>
+      <p:pic>
+        <p:nvPicPr>
+          <p:cNvPr id="105" name="" descr=""/>
+          <p:cNvPicPr/>
+          <p:nvPr/>
+        </p:nvPicPr>
+        <p:blipFill>
+          <a:blip r:embed="rId5"/>
+          <a:stretch/>
+        </p:blipFill>
+        <p:spPr>
+          <a:xfrm>
+            <a:off x="18022680" y="1661400"/>
+            <a:ext cx="3719520" cy="1461960"/>
+          </a:xfrm>
+          <a:prstGeom prst="rect">
+            <a:avLst/>
+          </a:prstGeom>
+          <a:ln w="0">
+            <a:noFill/>
+          </a:ln>
+        </p:spPr>
+      </p:pic>
+      <p:pic>
+        <p:nvPicPr>
+          <p:cNvPr id="106" name="" descr=""/>
+          <p:cNvPicPr/>
+          <p:nvPr/>
+        </p:nvPicPr>
+        <p:blipFill>
+          <a:blip r:embed="rId6"/>
+          <a:stretch/>
+        </p:blipFill>
+        <p:spPr>
+          <a:xfrm>
+            <a:off x="17950680" y="974880"/>
+            <a:ext cx="3429000" cy="1311120"/>
+          </a:xfrm>
+          <a:prstGeom prst="rect">
+            <a:avLst/>
+          </a:prstGeom>
+          <a:ln w="0">
+            <a:noFill/>
+          </a:ln>
+        </p:spPr>
+      </p:pic>
+      <p:sp>
+        <p:nvSpPr>
+          <p:cNvPr id="107" name="Rectangle 4"/>
+          <p:cNvSpPr/>
+          <p:nvPr/>
+        </p:nvSpPr>
+        <p:spPr>
+          <a:xfrm>
+            <a:off x="18516600" y="2775600"/>
+            <a:ext cx="493200" cy="654480"/>
+          </a:xfrm>
+          <a:prstGeom prst="rect">
+            <a:avLst/>
+          </a:prstGeom>
+          <a:solidFill>
+            <a:srgbClr val="009051">
+              <a:alpha val="28000"/>
+            </a:srgbClr>
+          </a:solidFill>
+          <a:ln w="12700">
+            <a:noFill/>
+          </a:ln>
+        </p:spPr>
+        <p:style>
+          <a:lnRef idx="0"/>
+          <a:fillRef idx="0"/>
+          <a:effectRef idx="0"/>
+          <a:fontRef idx="minor"/>
+        </p:style>
+        <p:txBody>
+          <a:bodyPr lIns="71280" rIns="71280" tIns="71280" bIns="71280" anchor="ctr">
+            <a:noAutofit/>
+          </a:bodyPr>
+          <a:p>
+            <a:endParaRPr b="0" lang="en-US" sz="3200" spc="-1" strike="noStrike">
+              <a:solidFill>
+                <a:srgbClr val="000000"/>
+              </a:solidFill>
+              <a:latin typeface="Myriad Pro"/>
+              <a:ea typeface="Myriad Pro"/>
+            </a:endParaRPr>
+          </a:p>
+        </p:txBody>
+      </p:sp>
+      <p:pic>
+        <p:nvPicPr>
+          <p:cNvPr id="108" name="" descr=""/>
+          <p:cNvPicPr/>
+          <p:nvPr/>
+        </p:nvPicPr>
+        <p:blipFill>
+          <a:blip r:embed="rId7"/>
+          <a:stretch/>
+        </p:blipFill>
+        <p:spPr>
+          <a:xfrm>
+            <a:off x="5749200" y="-781200"/>
+            <a:ext cx="9898200" cy="3763080"/>
+          </a:xfrm>
+          <a:prstGeom prst="rect">
+            <a:avLst/>
+          </a:prstGeom>
+          <a:ln w="0">
+            <a:noFill/>
+          </a:ln>
+        </p:spPr>
+      </p:pic>
+      <p:pic>
+        <p:nvPicPr>
+          <p:cNvPr id="109" name="" descr=""/>
+          <p:cNvPicPr/>
+          <p:nvPr/>
+        </p:nvPicPr>
+        <p:blipFill>
+          <a:blip r:embed="rId8"/>
+          <a:stretch/>
+        </p:blipFill>
+        <p:spPr>
+          <a:xfrm>
+            <a:off x="-138960" y="4182480"/>
+            <a:ext cx="11662920" cy="3438720"/>
+          </a:xfrm>
+          <a:prstGeom prst="rect">
+            <a:avLst/>
+          </a:prstGeom>
+          <a:ln w="0">
+            <a:noFill/>
+          </a:ln>
+        </p:spPr>
+      </p:pic>
+      <p:pic>
+        <p:nvPicPr>
+          <p:cNvPr id="110" name="" descr=""/>
+          <p:cNvPicPr/>
+          <p:nvPr/>
+        </p:nvPicPr>
+        <p:blipFill>
+          <a:blip r:embed="rId9"/>
+          <a:stretch/>
+        </p:blipFill>
+        <p:spPr>
+          <a:xfrm>
+            <a:off x="4469400" y="1406160"/>
+            <a:ext cx="15544800" cy="3271680"/>
+          </a:xfrm>
+          <a:prstGeom prst="rect">
+            <a:avLst/>
+          </a:prstGeom>
+          <a:ln w="0">
+            <a:noFill/>
+          </a:ln>
+        </p:spPr>
+      </p:pic>
+      <p:sp>
+        <p:nvSpPr>
+          <p:cNvPr id="111" name="Rectangle 5"/>
+          <p:cNvSpPr/>
+          <p:nvPr/>
+        </p:nvSpPr>
+        <p:spPr>
+          <a:xfrm>
+            <a:off x="18624600" y="3855600"/>
+            <a:ext cx="493200" cy="654480"/>
+          </a:xfrm>
+          <a:prstGeom prst="rect">
+            <a:avLst/>
+          </a:prstGeom>
+          <a:solidFill>
+            <a:srgbClr val="009051">
+              <a:alpha val="28000"/>
+            </a:srgbClr>
+          </a:solidFill>
+          <a:ln w="12700">
+            <a:noFill/>
+          </a:ln>
+        </p:spPr>
+        <p:style>
+          <a:lnRef idx="0"/>
+          <a:fillRef idx="0"/>
+          <a:effectRef idx="0"/>
+          <a:fontRef idx="minor"/>
+        </p:style>
+        <p:txBody>
+          <a:bodyPr lIns="71280" rIns="71280" tIns="71280" bIns="71280" anchor="ctr">
+            <a:noAutofit/>
+          </a:bodyPr>
+          <a:p>
+            <a:endParaRPr b="0" lang="en-US" sz="3200" spc="-1" strike="noStrike">
+              <a:solidFill>
+                <a:srgbClr val="000000"/>
+              </a:solidFill>
+              <a:latin typeface="Myriad Pro"/>
+              <a:ea typeface="Myriad Pro"/>
+            </a:endParaRPr>
+          </a:p>
+        </p:txBody>
+      </p:sp>
+      <p:pic>
+        <p:nvPicPr>
+          <p:cNvPr id="112" name="" descr=""/>
+          <p:cNvPicPr/>
+          <p:nvPr/>
+        </p:nvPicPr>
+        <p:blipFill>
+          <a:blip r:embed="rId10"/>
+          <a:stretch/>
+        </p:blipFill>
+        <p:spPr>
+          <a:xfrm>
+            <a:off x="18228600" y="2311200"/>
+            <a:ext cx="4932720" cy="1600200"/>
+          </a:xfrm>
+          <a:prstGeom prst="rect">
+            <a:avLst/>
+          </a:prstGeom>
+          <a:ln w="0">
+            <a:noFill/>
+          </a:ln>
+        </p:spPr>
+      </p:pic>
+      <p:pic>
+        <p:nvPicPr>
+          <p:cNvPr id="113" name="" descr=""/>
+          <p:cNvPicPr/>
+          <p:nvPr/>
+        </p:nvPicPr>
+        <p:blipFill>
+          <a:blip r:embed="rId11"/>
+          <a:stretch/>
+        </p:blipFill>
+        <p:spPr>
+          <a:xfrm>
+            <a:off x="18399600" y="3357000"/>
+            <a:ext cx="2832840" cy="1600200"/>
+          </a:xfrm>
+          <a:prstGeom prst="rect">
+            <a:avLst/>
+          </a:prstGeom>
+          <a:ln w="0">
+            <a:noFill/>
+          </a:ln>
+        </p:spPr>
+      </p:pic>
+      <p:pic>
+        <p:nvPicPr>
+          <p:cNvPr id="114" name="" descr=""/>
+          <p:cNvPicPr/>
+          <p:nvPr/>
+        </p:nvPicPr>
+        <p:blipFill>
+          <a:blip r:embed="rId12"/>
+          <a:stretch/>
+        </p:blipFill>
+        <p:spPr>
+          <a:xfrm>
+            <a:off x="13270320" y="6955200"/>
+            <a:ext cx="12693240" cy="2217600"/>
+          </a:xfrm>
+          <a:prstGeom prst="rect">
+            <a:avLst/>
+          </a:prstGeom>
+          <a:ln w="0">
+            <a:noFill/>
+          </a:ln>
+        </p:spPr>
+      </p:pic>
+      <p:pic>
+        <p:nvPicPr>
+          <p:cNvPr id="115" name="" descr=""/>
+          <p:cNvPicPr/>
+          <p:nvPr/>
+        </p:nvPicPr>
+        <p:blipFill>
+          <a:blip r:embed="rId13"/>
+          <a:stretch/>
+        </p:blipFill>
+        <p:spPr>
+          <a:xfrm>
+            <a:off x="4988160" y="10996200"/>
+            <a:ext cx="10177200" cy="1608840"/>
+          </a:xfrm>
+          <a:prstGeom prst="rect">
+            <a:avLst/>
+          </a:prstGeom>
+          <a:ln w="0">
+            <a:noFill/>
+          </a:ln>
+        </p:spPr>
+      </p:pic>
+      <p:pic>
+        <p:nvPicPr>
+          <p:cNvPr id="116" name="" descr=""/>
+          <p:cNvPicPr/>
+          <p:nvPr/>
+        </p:nvPicPr>
+        <p:blipFill>
+          <a:blip r:embed="rId14"/>
+          <a:stretch/>
+        </p:blipFill>
+        <p:spPr>
+          <a:xfrm>
+            <a:off x="544320" y="7700400"/>
+            <a:ext cx="9913320" cy="2127600"/>
+          </a:xfrm>
+          <a:prstGeom prst="rect">
+            <a:avLst/>
+          </a:prstGeom>
+          <a:ln w="0">
+            <a:noFill/>
+          </a:ln>
+        </p:spPr>
+      </p:pic>
+      <p:pic>
+        <p:nvPicPr>
+          <p:cNvPr id="117" name="" descr=""/>
+          <p:cNvPicPr/>
+          <p:nvPr/>
+        </p:nvPicPr>
+        <p:blipFill>
+          <a:blip r:embed="rId15"/>
+          <a:stretch/>
+        </p:blipFill>
+        <p:spPr>
+          <a:xfrm>
+            <a:off x="17198640" y="4491000"/>
+            <a:ext cx="9510840" cy="2041200"/>
+          </a:xfrm>
+          <a:prstGeom prst="rect">
+            <a:avLst/>
+          </a:prstGeom>
+          <a:ln w="0">
+            <a:noFill/>
+          </a:ln>
+        </p:spPr>
+      </p:pic>
+      <p:pic>
+        <p:nvPicPr>
+          <p:cNvPr id="118" name="" descr=""/>
+          <p:cNvPicPr/>
+          <p:nvPr/>
+        </p:nvPicPr>
+        <p:blipFill>
+          <a:blip r:embed="rId16"/>
+          <a:stretch/>
+        </p:blipFill>
+        <p:spPr>
+          <a:xfrm>
+            <a:off x="14772240" y="5344560"/>
+            <a:ext cx="10409760" cy="2234160"/>
+          </a:xfrm>
+          <a:prstGeom prst="rect">
+            <a:avLst/>
+          </a:prstGeom>
+          <a:ln w="0">
+            <a:noFill/>
+          </a:ln>
+        </p:spPr>
+      </p:pic>
+      <p:pic>
+        <p:nvPicPr>
+          <p:cNvPr id="119" name="" descr=""/>
+          <p:cNvPicPr/>
+          <p:nvPr/>
+        </p:nvPicPr>
+        <p:blipFill>
+          <a:blip r:embed="rId17"/>
+          <a:stretch/>
+        </p:blipFill>
+        <p:spPr>
+          <a:xfrm>
+            <a:off x="10143000" y="7478280"/>
+            <a:ext cx="3103200" cy="2765520"/>
+          </a:xfrm>
+          <a:prstGeom prst="rect">
+            <a:avLst/>
+          </a:prstGeom>
+          <a:ln w="0">
+            <a:noFill/>
+          </a:ln>
+        </p:spPr>
+      </p:pic>
+      <p:sp>
+        <p:nvSpPr>
+          <p:cNvPr id="120" name="Connection Line 5"/>
+          <p:cNvSpPr/>
+          <p:nvPr/>
+        </p:nvSpPr>
+        <p:spPr>
+          <a:xfrm>
+            <a:off x="7016400" y="9439920"/>
+            <a:ext cx="685800" cy="847080"/>
+          </a:xfrm>
+          <a:custGeom>
+            <a:avLst/>
+            <a:gdLst>
+              <a:gd name="textAreaLeft" fmla="*/ 0 w 685800"/>
+              <a:gd name="textAreaRight" fmla="*/ 686160 w 685800"/>
+              <a:gd name="textAreaTop" fmla="*/ 0 h 847080"/>
+              <a:gd name="textAreaBottom" fmla="*/ 848160 h 847080"/>
+            </a:gdLst>
+            <a:ahLst/>
+            <a:rect l="textAreaLeft" t="textAreaTop" r="textAreaRight" b="textAreaBottom"/>
+            <a:pathLst>
+              <a:path w="21423" h="20621">
+                <a:moveTo>
+                  <a:pt x="0" y="20508"/>
+                </a:moveTo>
+                <a:cubicBezTo>
+                  <a:pt x="14460" y="21600"/>
+                  <a:pt x="21600" y="14764"/>
+                  <a:pt x="21420" y="0"/>
+                </a:cubicBezTo>
+              </a:path>
+            </a:pathLst>
+          </a:custGeom>
+          <a:noFill/>
+          <a:ln w="50800">
+            <a:solidFill>
+              <a:srgbClr val="000000"/>
+            </a:solidFill>
+            <a:miter/>
+            <a:headEnd len="med" type="triangle" w="med"/>
+          </a:ln>
+        </p:spPr>
+        <p:style>
+          <a:lnRef idx="0"/>
+          <a:fillRef idx="0"/>
+          <a:effectRef idx="0"/>
+          <a:fontRef idx="minor"/>
+        </p:style>
+        <p:txBody>
+          <a:bodyPr lIns="90000" rIns="90000" tIns="45000" bIns="45000" anchor="t">
+            <a:noAutofit/>
+          </a:bodyPr>
+          <a:p>
+            <a:endParaRPr b="1" lang="en-US" sz="3000" spc="-1" strike="noStrike">
+              <a:solidFill>
+                <a:srgbClr val="000000"/>
+              </a:solidFill>
+              <a:latin typeface="Helvetica Neue"/>
+              <a:ea typeface="Helvetica Neue"/>
+            </a:endParaRPr>
+          </a:p>
+        </p:txBody>
+      </p:sp>
+      <p:sp>
+        <p:nvSpPr>
+          <p:cNvPr id="121" name="Rectangle 6"/>
+          <p:cNvSpPr/>
+          <p:nvPr/>
+        </p:nvSpPr>
+        <p:spPr>
+          <a:xfrm>
+            <a:off x="7507800" y="8915400"/>
+            <a:ext cx="448560" cy="524520"/>
+          </a:xfrm>
+          <a:prstGeom prst="rect">
+            <a:avLst/>
+          </a:prstGeom>
+          <a:solidFill>
+            <a:srgbClr val="224b12">
+              <a:alpha val="28000"/>
+            </a:srgbClr>
+          </a:solidFill>
+          <a:ln w="12700">
+            <a:noFill/>
+          </a:ln>
+        </p:spPr>
+        <p:style>
+          <a:lnRef idx="0"/>
+          <a:fillRef idx="0"/>
+          <a:effectRef idx="0"/>
+          <a:fontRef idx="minor"/>
+        </p:style>
+        <p:txBody>
+          <a:bodyPr lIns="71280" rIns="71280" tIns="71280" bIns="71280" anchor="ctr">
+            <a:noAutofit/>
+          </a:bodyPr>
+          <a:p>
+            <a:endParaRPr b="0" lang="en-US" sz="3200" spc="-1" strike="noStrike">
+              <a:solidFill>
+                <a:srgbClr val="000000"/>
+              </a:solidFill>
+              <a:latin typeface="Myriad Pro"/>
+              <a:ea typeface="Myriad Pro"/>
+            </a:endParaRPr>
+          </a:p>
+        </p:txBody>
+      </p:sp>
+      <p:sp>
+        <p:nvSpPr>
+          <p:cNvPr id="122" name="Rectangle 7"/>
+          <p:cNvSpPr/>
+          <p:nvPr/>
+        </p:nvSpPr>
+        <p:spPr>
+          <a:xfrm>
+            <a:off x="4033800" y="10094400"/>
+            <a:ext cx="493200" cy="453240"/>
+          </a:xfrm>
+          <a:prstGeom prst="rect">
+            <a:avLst/>
+          </a:prstGeom>
+          <a:solidFill>
+            <a:srgbClr val="224b12">
+              <a:alpha val="28000"/>
+            </a:srgbClr>
+          </a:solidFill>
+          <a:ln w="12700">
+            <a:noFill/>
+          </a:ln>
+        </p:spPr>
+        <p:style>
+          <a:lnRef idx="0"/>
+          <a:fillRef idx="0"/>
+          <a:effectRef idx="0"/>
+          <a:fontRef idx="minor"/>
+        </p:style>
+        <p:txBody>
+          <a:bodyPr lIns="71280" rIns="71280" tIns="71280" bIns="71280" anchor="ctr">
+            <a:noAutofit/>
+          </a:bodyPr>
+          <a:p>
+            <a:endParaRPr b="0" lang="en-US" sz="3200" spc="-1" strike="noStrike">
+              <a:solidFill>
+                <a:srgbClr val="000000"/>
               </a:solidFill>
               <a:latin typeface="Myriad Pro"/>
               <a:ea typeface="Myriad Pro"/>

</xml_diff>

<commit_message>
Minor improvements and fixes
</commit_message>
<xml_diff>
--- a/docs/what_combine_does/CombineLikelihoodEqns.pptx
+++ b/docs/what_combine_does/CombineLikelihoodEqns.pptx
@@ -43,7 +43,7 @@
         <p:txBody>
           <a:bodyPr/>
           <a:p>
-            <a:fld id="{6173F107-8F15-4856-8F29-1FE853F21DE1}" type="slidenum">
+            <a:fld id="{72778E89-2093-4BC6-9475-6443569E3BA6}" type="slidenum">
               <a:t>&lt;#&gt;</a:t>
             </a:fld>
           </a:p>
@@ -211,7 +211,7 @@
         <p:txBody>
           <a:bodyPr/>
           <a:p>
-            <a:fld id="{5B6B4F63-E7B6-47CF-BF8D-5B587511F8BB}" type="slidenum">
+            <a:fld id="{CD5AAF1B-2F2C-4967-AA33-FCE15D30267E}" type="slidenum">
               <a:t>&lt;#&gt;</a:t>
             </a:fld>
           </a:p>
@@ -465,7 +465,7 @@
         <p:txBody>
           <a:bodyPr/>
           <a:p>
-            <a:fld id="{E402B150-4AB1-470A-BAD7-6F1D1EAE278E}" type="slidenum">
+            <a:fld id="{AF7BF580-A3B9-4264-9361-44D93CBB4BB2}" type="slidenum">
               <a:t>&lt;#&gt;</a:t>
             </a:fld>
           </a:p>
@@ -805,7 +805,7 @@
         <p:txBody>
           <a:bodyPr/>
           <a:p>
-            <a:fld id="{15F0DE30-D38D-4F40-BFE8-E66E46417E9B}" type="slidenum">
+            <a:fld id="{3DCD6F05-E0A6-4AD3-9654-8C11B23DA1ED}" type="slidenum">
               <a:t>&lt;#&gt;</a:t>
             </a:fld>
           </a:p>
@@ -927,7 +927,7 @@
         <p:txBody>
           <a:bodyPr/>
           <a:p>
-            <a:fld id="{5270902E-1F5B-4ED4-BF57-850DAD9B9399}" type="slidenum">
+            <a:fld id="{A66F4DC3-E6EE-41D2-A6FF-A52641B1CAA9}" type="slidenum">
               <a:t>&lt;#&gt;</a:t>
             </a:fld>
           </a:p>
@@ -1052,7 +1052,7 @@
         <p:txBody>
           <a:bodyPr/>
           <a:p>
-            <a:fld id="{5E8F1E75-1C5F-47B3-87EF-EF55EF273BA0}" type="slidenum">
+            <a:fld id="{C3AEBF6D-95FF-4020-B5CA-FFD84989272F}" type="slidenum">
               <a:t>&lt;#&gt;</a:t>
             </a:fld>
           </a:p>
@@ -1220,7 +1220,7 @@
         <p:txBody>
           <a:bodyPr/>
           <a:p>
-            <a:fld id="{E69B1AE6-E69B-4990-B625-C32500553586}" type="slidenum">
+            <a:fld id="{38A1A072-6D6E-40D7-8310-16AE282E4613}" type="slidenum">
               <a:t>&lt;#&gt;</a:t>
             </a:fld>
           </a:p>
@@ -1302,7 +1302,7 @@
         <p:txBody>
           <a:bodyPr/>
           <a:p>
-            <a:fld id="{83304B04-B042-4D73-8E2C-EA15938AD14F}" type="slidenum">
+            <a:fld id="{FE043681-B705-4074-A8E9-B2F9132BFC24}" type="slidenum">
               <a:t>&lt;#&gt;</a:t>
             </a:fld>
           </a:p>
@@ -1382,7 +1382,7 @@
         <p:txBody>
           <a:bodyPr/>
           <a:p>
-            <a:fld id="{3F957EFB-EADF-4750-8B25-D361881BC742}" type="slidenum">
+            <a:fld id="{816BB54B-9156-46EB-9FC0-ACFA3F371C4A}" type="slidenum">
               <a:t>&lt;#&gt;</a:t>
             </a:fld>
           </a:p>
@@ -1593,7 +1593,7 @@
         <p:txBody>
           <a:bodyPr/>
           <a:p>
-            <a:fld id="{938610CB-006D-4257-BC3C-177475FCBCCB}" type="slidenum">
+            <a:fld id="{4EA2CF63-495E-436B-AFD7-F2D6A024C5AA}" type="slidenum">
               <a:t>&lt;#&gt;</a:t>
             </a:fld>
           </a:p>
@@ -1804,7 +1804,7 @@
         <p:txBody>
           <a:bodyPr/>
           <a:p>
-            <a:fld id="{C1655C1E-2DFF-4DBC-B6BA-965887BBFB1B}" type="slidenum">
+            <a:fld id="{8027260A-156D-4037-97F2-0771083480E2}" type="slidenum">
               <a:t>&lt;#&gt;</a:t>
             </a:fld>
           </a:p>
@@ -2015,7 +2015,7 @@
         <p:txBody>
           <a:bodyPr/>
           <a:p>
-            <a:fld id="{C6704D23-1C4D-4169-8133-AA7C04438B06}" type="slidenum">
+            <a:fld id="{DEBE14EA-D6A4-450F-A0AF-85FF47BEA448}" type="slidenum">
               <a:t>&lt;#&gt;</a:t>
             </a:fld>
           </a:p>
@@ -2078,11 +2078,11 @@
             <a:noAutofit/>
           </a:bodyPr>
           <a:p>
-            <a:pPr indent="0">
+            <a:pPr indent="0" algn="ctr">
               <a:buNone/>
             </a:pPr>
             <a:r>
-              <a:rPr b="0" lang="en-US" sz="1800" spc="-1" strike="noStrike">
+              <a:rPr b="0" lang="en-US" sz="4400" spc="-1" strike="noStrike">
                 <a:solidFill>
                   <a:srgbClr val="000000"/>
                 </a:solidFill>
@@ -2090,7 +2090,7 @@
               </a:rPr>
               <a:t>Click to edit the title text format</a:t>
             </a:r>
-            <a:endParaRPr b="0" lang="en-US" sz="1800" spc="-1" strike="noStrike">
+            <a:endParaRPr b="0" lang="en-US" sz="4400" spc="-1" strike="noStrike">
               <a:solidFill>
                 <a:srgbClr val="000000"/>
               </a:solidFill>
@@ -2154,7 +2154,7 @@
                 <a:tab algn="l" pos="0"/>
               </a:tabLst>
             </a:pPr>
-            <a:fld id="{C38DA72E-DA6E-4BB7-9280-8013F0D1CEEF}" type="slidenum">
+            <a:fld id="{419ECBC7-4F20-41DA-9E32-4238738F2B5E}" type="slidenum">
               <a:rPr b="0" lang="en-US" sz="2400" spc="-1" strike="noStrike">
                 <a:solidFill>
                   <a:srgbClr val="000000"/>
@@ -2454,7 +2454,7 @@
               <a:alpha val="33000"/>
             </a:srgbClr>
           </a:solidFill>
-          <a:ln w="12700">
+          <a:ln w="12600">
             <a:noFill/>
           </a:ln>
         </p:spPr>
@@ -2469,14 +2469,6 @@
             <a:noAutofit/>
           </a:bodyPr>
           <a:p>
-            <a:pPr algn="ctr">
-              <a:lnSpc>
-                <a:spcPct val="100000"/>
-              </a:lnSpc>
-              <a:tabLst>
-                <a:tab algn="l" pos="0"/>
-              </a:tabLst>
-            </a:pPr>
             <a:endParaRPr b="0" lang="en-US" sz="3200" spc="-1" strike="noStrike">
               <a:solidFill>
                 <a:srgbClr val="000000"/>
@@ -2506,7 +2498,7 @@
               <a:alpha val="43000"/>
             </a:srgbClr>
           </a:solidFill>
-          <a:ln w="12700">
+          <a:ln w="12600">
             <a:noFill/>
           </a:ln>
         </p:spPr>
@@ -2521,14 +2513,6 @@
             <a:noAutofit/>
           </a:bodyPr>
           <a:p>
-            <a:pPr algn="ctr">
-              <a:lnSpc>
-                <a:spcPct val="100000"/>
-              </a:lnSpc>
-              <a:tabLst>
-                <a:tab algn="l" pos="0"/>
-              </a:tabLst>
-            </a:pPr>
             <a:endParaRPr b="0" lang="en-US" sz="3200" spc="-1" strike="noStrike">
               <a:solidFill>
                 <a:srgbClr val="000000"/>
@@ -2558,7 +2542,7 @@
               <a:alpha val="43000"/>
             </a:srgbClr>
           </a:solidFill>
-          <a:ln w="12700">
+          <a:ln w="12600">
             <a:noFill/>
           </a:ln>
         </p:spPr>
@@ -2573,14 +2557,6 @@
             <a:noAutofit/>
           </a:bodyPr>
           <a:p>
-            <a:pPr algn="ctr">
-              <a:lnSpc>
-                <a:spcPct val="100000"/>
-              </a:lnSpc>
-              <a:tabLst>
-                <a:tab algn="l" pos="0"/>
-              </a:tabLst>
-            </a:pPr>
             <a:endParaRPr b="0" lang="en-US" sz="3200" spc="-1" strike="noStrike">
               <a:solidFill>
                 <a:srgbClr val="000000"/>
@@ -2610,7 +2586,7 @@
               <a:alpha val="27000"/>
             </a:srgbClr>
           </a:solidFill>
-          <a:ln w="12700">
+          <a:ln w="12600">
             <a:noFill/>
           </a:ln>
         </p:spPr>
@@ -2625,14 +2601,6 @@
             <a:noAutofit/>
           </a:bodyPr>
           <a:p>
-            <a:pPr algn="ctr">
-              <a:lnSpc>
-                <a:spcPct val="100000"/>
-              </a:lnSpc>
-              <a:tabLst>
-                <a:tab algn="l" pos="0"/>
-              </a:tabLst>
-            </a:pPr>
             <a:endParaRPr b="0" lang="en-US" sz="3200" spc="-1" strike="noStrike">
               <a:solidFill>
                 <a:srgbClr val="000000"/>
@@ -2662,7 +2630,7 @@
               <a:alpha val="27000"/>
             </a:srgbClr>
           </a:solidFill>
-          <a:ln w="12700">
+          <a:ln w="12600">
             <a:noFill/>
           </a:ln>
         </p:spPr>
@@ -2677,14 +2645,6 @@
             <a:noAutofit/>
           </a:bodyPr>
           <a:p>
-            <a:pPr algn="ctr">
-              <a:lnSpc>
-                <a:spcPct val="100000"/>
-              </a:lnSpc>
-              <a:tabLst>
-                <a:tab algn="l" pos="0"/>
-              </a:tabLst>
-            </a:pPr>
             <a:endParaRPr b="0" lang="en-US" sz="3200" spc="-1" strike="noStrike">
               <a:solidFill>
                 <a:srgbClr val="000000"/>
@@ -2714,7 +2674,7 @@
               <a:alpha val="30000"/>
             </a:srgbClr>
           </a:solidFill>
-          <a:ln w="12700">
+          <a:ln w="12600">
             <a:noFill/>
           </a:ln>
         </p:spPr>
@@ -2729,14 +2689,6 @@
             <a:noAutofit/>
           </a:bodyPr>
           <a:p>
-            <a:pPr algn="ctr">
-              <a:lnSpc>
-                <a:spcPct val="100000"/>
-              </a:lnSpc>
-              <a:tabLst>
-                <a:tab algn="l" pos="0"/>
-              </a:tabLst>
-            </a:pPr>
             <a:endParaRPr b="0" lang="en-US" sz="3200" spc="-1" strike="noStrike">
               <a:solidFill>
                 <a:srgbClr val="000000"/>
@@ -2766,7 +2718,7 @@
               <a:alpha val="30000"/>
             </a:srgbClr>
           </a:solidFill>
-          <a:ln w="12700">
+          <a:ln w="12600">
             <a:noFill/>
           </a:ln>
         </p:spPr>
@@ -2781,14 +2733,6 @@
             <a:noAutofit/>
           </a:bodyPr>
           <a:p>
-            <a:pPr algn="ctr">
-              <a:lnSpc>
-                <a:spcPct val="100000"/>
-              </a:lnSpc>
-              <a:tabLst>
-                <a:tab algn="l" pos="0"/>
-              </a:tabLst>
-            </a:pPr>
             <a:endParaRPr b="0" lang="en-US" sz="3200" spc="-1" strike="noStrike">
               <a:solidFill>
                 <a:srgbClr val="000000"/>
@@ -2818,7 +2762,7 @@
               <a:alpha val="43000"/>
             </a:srgbClr>
           </a:solidFill>
-          <a:ln w="12700">
+          <a:ln w="12600">
             <a:noFill/>
           </a:ln>
         </p:spPr>
@@ -2833,14 +2777,6 @@
             <a:noAutofit/>
           </a:bodyPr>
           <a:p>
-            <a:pPr algn="ctr">
-              <a:lnSpc>
-                <a:spcPct val="100000"/>
-              </a:lnSpc>
-              <a:tabLst>
-                <a:tab algn="l" pos="0"/>
-              </a:tabLst>
-            </a:pPr>
             <a:endParaRPr b="0" lang="en-US" sz="3200" spc="-1" strike="noStrike">
               <a:solidFill>
                 <a:srgbClr val="000000"/>
@@ -2870,7 +2806,7 @@
               <a:alpha val="43000"/>
             </a:srgbClr>
           </a:solidFill>
-          <a:ln w="12700">
+          <a:ln w="12600">
             <a:noFill/>
           </a:ln>
         </p:spPr>
@@ -2885,14 +2821,6 @@
             <a:noAutofit/>
           </a:bodyPr>
           <a:p>
-            <a:pPr algn="ctr">
-              <a:lnSpc>
-                <a:spcPct val="100000"/>
-              </a:lnSpc>
-              <a:tabLst>
-                <a:tab algn="l" pos="0"/>
-              </a:tabLst>
-            </a:pPr>
             <a:endParaRPr b="0" lang="en-US" sz="3200" spc="-1" strike="noStrike">
               <a:solidFill>
                 <a:srgbClr val="000000"/>
@@ -2918,7 +2846,7 @@
             <a:avLst/>
           </a:prstGeom>
           <a:noFill/>
-          <a:ln w="12700">
+          <a:ln w="12600">
             <a:noFill/>
           </a:ln>
         </p:spPr>
@@ -2979,7 +2907,7 @@
               <a:alpha val="28000"/>
             </a:srgbClr>
           </a:solidFill>
-          <a:ln w="12700">
+          <a:ln w="12600">
             <a:noFill/>
           </a:ln>
         </p:spPr>
@@ -2994,14 +2922,6 @@
             <a:noAutofit/>
           </a:bodyPr>
           <a:p>
-            <a:pPr algn="ctr">
-              <a:lnSpc>
-                <a:spcPct val="100000"/>
-              </a:lnSpc>
-              <a:tabLst>
-                <a:tab algn="l" pos="0"/>
-              </a:tabLst>
-            </a:pPr>
             <a:endParaRPr b="0" lang="en-US" sz="3200" spc="-1" strike="noStrike">
               <a:solidFill>
                 <a:srgbClr val="011993"/>
@@ -3029,7 +2949,7 @@
           <a:solidFill>
             <a:srgbClr val="ffffff"/>
           </a:solidFill>
-          <a:ln w="12700">
+          <a:ln w="12600">
             <a:noFill/>
           </a:ln>
         </p:spPr>
@@ -3044,14 +2964,6 @@
             <a:noAutofit/>
           </a:bodyPr>
           <a:p>
-            <a:pPr algn="ctr">
-              <a:lnSpc>
-                <a:spcPct val="100000"/>
-              </a:lnSpc>
-              <a:tabLst>
-                <a:tab algn="l" pos="0"/>
-              </a:tabLst>
-            </a:pPr>
             <a:endParaRPr b="0" lang="en-US" sz="3200" spc="-1" strike="noStrike">
               <a:solidFill>
                 <a:srgbClr val="000000"/>
@@ -3081,7 +2993,7 @@
               <a:alpha val="33000"/>
             </a:srgbClr>
           </a:solidFill>
-          <a:ln w="12700">
+          <a:ln w="12600">
             <a:noFill/>
           </a:ln>
         </p:spPr>
@@ -3096,14 +3008,6 @@
             <a:noAutofit/>
           </a:bodyPr>
           <a:p>
-            <a:pPr algn="ctr">
-              <a:lnSpc>
-                <a:spcPct val="100000"/>
-              </a:lnSpc>
-              <a:tabLst>
-                <a:tab algn="l" pos="0"/>
-              </a:tabLst>
-            </a:pPr>
             <a:endParaRPr b="0" lang="en-US" sz="3200" spc="-1" strike="noStrike">
               <a:solidFill>
                 <a:srgbClr val="000000"/>
@@ -3133,7 +3037,7 @@
               <a:alpha val="33000"/>
             </a:srgbClr>
           </a:solidFill>
-          <a:ln w="12700">
+          <a:ln w="12600">
             <a:noFill/>
           </a:ln>
         </p:spPr>
@@ -3148,14 +3052,6 @@
             <a:noAutofit/>
           </a:bodyPr>
           <a:p>
-            <a:pPr algn="ctr">
-              <a:lnSpc>
-                <a:spcPct val="100000"/>
-              </a:lnSpc>
-              <a:tabLst>
-                <a:tab algn="l" pos="0"/>
-              </a:tabLst>
-            </a:pPr>
             <a:endParaRPr b="0" lang="en-US" sz="3200" spc="-1" strike="noStrike">
               <a:solidFill>
                 <a:srgbClr val="000000"/>
@@ -3201,7 +3097,7 @@
             </a:pathLst>
           </a:custGeom>
           <a:noFill/>
-          <a:ln w="50800">
+          <a:ln w="50760">
             <a:solidFill>
               <a:srgbClr val="000000"/>
             </a:solidFill>
@@ -3220,14 +3116,6 @@
             <a:noAutofit/>
           </a:bodyPr>
           <a:p>
-            <a:pPr algn="ctr">
-              <a:lnSpc>
-                <a:spcPct val="100000"/>
-              </a:lnSpc>
-              <a:tabLst>
-                <a:tab algn="l" pos="0"/>
-              </a:tabLst>
-            </a:pPr>
             <a:endParaRPr b="1" lang="en-US" sz="3000" spc="-1" strike="noStrike">
               <a:solidFill>
                 <a:srgbClr val="000000"/>
@@ -3253,7 +3141,7 @@
             <a:avLst/>
           </a:prstGeom>
           <a:noFill/>
-          <a:ln w="12700">
+          <a:ln w="12600">
             <a:noFill/>
           </a:ln>
         </p:spPr>
@@ -3314,7 +3202,7 @@
               <a:alpha val="28000"/>
             </a:srgbClr>
           </a:solidFill>
-          <a:ln w="12700">
+          <a:ln w="12600">
             <a:noFill/>
           </a:ln>
         </p:spPr>
@@ -3329,14 +3217,6 @@
             <a:noAutofit/>
           </a:bodyPr>
           <a:p>
-            <a:pPr algn="ctr">
-              <a:lnSpc>
-                <a:spcPct val="100000"/>
-              </a:lnSpc>
-              <a:tabLst>
-                <a:tab algn="l" pos="0"/>
-              </a:tabLst>
-            </a:pPr>
             <a:endParaRPr b="0" lang="en-US" sz="3200" spc="-1" strike="noStrike">
               <a:solidFill>
                 <a:srgbClr val="000000"/>
@@ -3366,7 +3246,7 @@
               <a:alpha val="40000"/>
             </a:srgbClr>
           </a:solidFill>
-          <a:ln w="12700">
+          <a:ln w="12600">
             <a:noFill/>
           </a:ln>
         </p:spPr>
@@ -3381,14 +3261,6 @@
             <a:noAutofit/>
           </a:bodyPr>
           <a:p>
-            <a:pPr algn="ctr">
-              <a:lnSpc>
-                <a:spcPct val="100000"/>
-              </a:lnSpc>
-              <a:tabLst>
-                <a:tab algn="l" pos="0"/>
-              </a:tabLst>
-            </a:pPr>
             <a:endParaRPr b="0" lang="en-US" sz="3200" spc="-1" strike="noStrike">
               <a:solidFill>
                 <a:srgbClr val="000000"/>
@@ -3418,7 +3290,7 @@
               <a:alpha val="25000"/>
             </a:srgbClr>
           </a:solidFill>
-          <a:ln w="12700">
+          <a:ln w="12600">
             <a:noFill/>
           </a:ln>
         </p:spPr>
@@ -3433,14 +3305,6 @@
             <a:noAutofit/>
           </a:bodyPr>
           <a:p>
-            <a:pPr algn="ctr">
-              <a:lnSpc>
-                <a:spcPct val="100000"/>
-              </a:lnSpc>
-              <a:tabLst>
-                <a:tab algn="l" pos="0"/>
-              </a:tabLst>
-            </a:pPr>
             <a:endParaRPr b="0" lang="en-US" sz="3200" spc="-1" strike="noStrike">
               <a:solidFill>
                 <a:srgbClr val="000000"/>
@@ -3470,7 +3334,7 @@
               <a:alpha val="33000"/>
             </a:srgbClr>
           </a:solidFill>
-          <a:ln w="12700">
+          <a:ln w="12600">
             <a:noFill/>
           </a:ln>
         </p:spPr>
@@ -3485,14 +3349,6 @@
             <a:noAutofit/>
           </a:bodyPr>
           <a:p>
-            <a:pPr algn="ctr">
-              <a:lnSpc>
-                <a:spcPct val="100000"/>
-              </a:lnSpc>
-              <a:tabLst>
-                <a:tab algn="l" pos="0"/>
-              </a:tabLst>
-            </a:pPr>
             <a:endParaRPr b="0" lang="en-US" sz="3200" spc="-1" strike="noStrike">
               <a:solidFill>
                 <a:srgbClr val="000000"/>
@@ -3522,7 +3378,7 @@
               <a:alpha val="39000"/>
             </a:srgbClr>
           </a:solidFill>
-          <a:ln w="12700">
+          <a:ln w="12600">
             <a:noFill/>
           </a:ln>
         </p:spPr>
@@ -3537,14 +3393,6 @@
             <a:noAutofit/>
           </a:bodyPr>
           <a:p>
-            <a:pPr algn="ctr">
-              <a:lnSpc>
-                <a:spcPct val="100000"/>
-              </a:lnSpc>
-              <a:tabLst>
-                <a:tab algn="l" pos="0"/>
-              </a:tabLst>
-            </a:pPr>
             <a:endParaRPr b="0" lang="en-US" sz="3200" spc="-1" strike="noStrike">
               <a:solidFill>
                 <a:srgbClr val="000000"/>
@@ -3574,7 +3422,7 @@
               <a:alpha val="43000"/>
             </a:srgbClr>
           </a:solidFill>
-          <a:ln w="12700">
+          <a:ln w="12600">
             <a:noFill/>
           </a:ln>
         </p:spPr>
@@ -3589,14 +3437,6 @@
             <a:noAutofit/>
           </a:bodyPr>
           <a:p>
-            <a:pPr algn="ctr">
-              <a:lnSpc>
-                <a:spcPct val="100000"/>
-              </a:lnSpc>
-              <a:tabLst>
-                <a:tab algn="l" pos="0"/>
-              </a:tabLst>
-            </a:pPr>
             <a:endParaRPr b="0" lang="en-US" sz="3200" spc="-1" strike="noStrike">
               <a:solidFill>
                 <a:srgbClr val="000000"/>
@@ -3626,7 +3466,7 @@
               <a:alpha val="28000"/>
             </a:srgbClr>
           </a:solidFill>
-          <a:ln w="12700">
+          <a:ln w="12600">
             <a:noFill/>
           </a:ln>
         </p:spPr>
@@ -3641,14 +3481,6 @@
             <a:noAutofit/>
           </a:bodyPr>
           <a:p>
-            <a:pPr algn="ctr">
-              <a:lnSpc>
-                <a:spcPct val="100000"/>
-              </a:lnSpc>
-              <a:tabLst>
-                <a:tab algn="l" pos="0"/>
-              </a:tabLst>
-            </a:pPr>
             <a:endParaRPr b="0" lang="en-US" sz="3200" spc="-1" strike="noStrike">
               <a:solidFill>
                 <a:srgbClr val="000000"/>
@@ -3678,7 +3510,7 @@
               <a:alpha val="23000"/>
             </a:srgbClr>
           </a:solidFill>
-          <a:ln w="12700">
+          <a:ln w="12600">
             <a:noFill/>
           </a:ln>
         </p:spPr>
@@ -3693,14 +3525,6 @@
             <a:noAutofit/>
           </a:bodyPr>
           <a:p>
-            <a:pPr algn="ctr">
-              <a:lnSpc>
-                <a:spcPct val="100000"/>
-              </a:lnSpc>
-              <a:tabLst>
-                <a:tab algn="l" pos="0"/>
-              </a:tabLst>
-            </a:pPr>
             <a:endParaRPr b="0" lang="en-US" sz="3200" spc="-1" strike="noStrike">
               <a:solidFill>
                 <a:srgbClr val="000000"/>
@@ -3730,7 +3554,7 @@
               <a:alpha val="23000"/>
             </a:srgbClr>
           </a:solidFill>
-          <a:ln w="12700">
+          <a:ln w="12600">
             <a:noFill/>
           </a:ln>
         </p:spPr>
@@ -3745,14 +3569,6 @@
             <a:noAutofit/>
           </a:bodyPr>
           <a:p>
-            <a:pPr algn="ctr">
-              <a:lnSpc>
-                <a:spcPct val="100000"/>
-              </a:lnSpc>
-              <a:tabLst>
-                <a:tab algn="l" pos="0"/>
-              </a:tabLst>
-            </a:pPr>
             <a:endParaRPr b="0" lang="en-US" sz="3200" spc="-1" strike="noStrike">
               <a:solidFill>
                 <a:srgbClr val="000000"/>
@@ -3798,7 +3614,7 @@
             </a:pathLst>
           </a:custGeom>
           <a:noFill/>
-          <a:ln w="50800">
+          <a:ln w="50760">
             <a:solidFill>
               <a:srgbClr val="000000"/>
             </a:solidFill>
@@ -3817,14 +3633,6 @@
             <a:noAutofit/>
           </a:bodyPr>
           <a:p>
-            <a:pPr algn="ctr">
-              <a:lnSpc>
-                <a:spcPct val="100000"/>
-              </a:lnSpc>
-              <a:tabLst>
-                <a:tab algn="l" pos="0"/>
-              </a:tabLst>
-            </a:pPr>
             <a:endParaRPr b="1" lang="en-US" sz="3000" spc="-1" strike="noStrike">
               <a:solidFill>
                 <a:srgbClr val="000000"/>
@@ -3870,7 +3678,7 @@
             </a:pathLst>
           </a:custGeom>
           <a:noFill/>
-          <a:ln w="50800">
+          <a:ln w="50760">
             <a:solidFill>
               <a:srgbClr val="000000"/>
             </a:solidFill>
@@ -3889,14 +3697,6 @@
             <a:noAutofit/>
           </a:bodyPr>
           <a:p>
-            <a:pPr algn="ctr">
-              <a:lnSpc>
-                <a:spcPct val="100000"/>
-              </a:lnSpc>
-              <a:tabLst>
-                <a:tab algn="l" pos="0"/>
-              </a:tabLst>
-            </a:pPr>
             <a:endParaRPr b="1" lang="en-US" sz="3000" spc="-1" strike="noStrike">
               <a:solidFill>
                 <a:srgbClr val="000000"/>
@@ -3922,7 +3722,7 @@
             <a:avLst/>
           </a:prstGeom>
           <a:noFill/>
-          <a:ln w="12700">
+          <a:ln w="12600">
             <a:noFill/>
           </a:ln>
         </p:spPr>
@@ -3979,7 +3779,7 @@
             <a:avLst/>
           </a:prstGeom>
           <a:noFill/>
-          <a:ln w="12700">
+          <a:ln w="12600">
             <a:noFill/>
           </a:ln>
         </p:spPr>
@@ -4036,7 +3836,7 @@
             <a:avLst/>
           </a:prstGeom>
           <a:noFill/>
-          <a:ln w="12700">
+          <a:ln w="12600">
             <a:noFill/>
           </a:ln>
         </p:spPr>
@@ -4093,7 +3893,7 @@
             <a:avLst/>
           </a:prstGeom>
           <a:noFill/>
-          <a:ln w="12700">
+          <a:ln w="12600">
             <a:noFill/>
           </a:ln>
         </p:spPr>
@@ -4150,7 +3950,7 @@
             <a:avLst/>
           </a:prstGeom>
           <a:noFill/>
-          <a:ln w="12700">
+          <a:ln w="12600">
             <a:noFill/>
           </a:ln>
         </p:spPr>
@@ -4207,7 +4007,7 @@
             <a:avLst/>
           </a:prstGeom>
           <a:noFill/>
-          <a:ln w="12700">
+          <a:ln w="12600">
             <a:noFill/>
           </a:ln>
         </p:spPr>
@@ -4264,7 +4064,7 @@
             <a:avLst/>
           </a:prstGeom>
           <a:noFill/>
-          <a:ln w="12700">
+          <a:ln w="12600">
             <a:noFill/>
           </a:ln>
         </p:spPr>
@@ -4321,7 +4121,7 @@
             <a:avLst/>
           </a:prstGeom>
           <a:noFill/>
-          <a:ln w="12700">
+          <a:ln w="12600">
             <a:noFill/>
           </a:ln>
         </p:spPr>
@@ -4378,7 +4178,7 @@
             <a:avLst/>
           </a:prstGeom>
           <a:noFill/>
-          <a:ln w="12700">
+          <a:ln w="12600">
             <a:noFill/>
           </a:ln>
         </p:spPr>
@@ -4435,7 +4235,7 @@
             <a:avLst/>
           </a:prstGeom>
           <a:noFill/>
-          <a:ln w="12700">
+          <a:ln w="12600">
             <a:noFill/>
           </a:ln>
         </p:spPr>
@@ -4492,7 +4292,7 @@
             <a:avLst/>
           </a:prstGeom>
           <a:noFill/>
-          <a:ln w="12700">
+          <a:ln w="12600">
             <a:noFill/>
           </a:ln>
         </p:spPr>
@@ -4549,7 +4349,7 @@
             <a:avLst/>
           </a:prstGeom>
           <a:noFill/>
-          <a:ln w="12700">
+          <a:ln w="12600">
             <a:noFill/>
           </a:ln>
         </p:spPr>
@@ -4606,7 +4406,7 @@
             <a:avLst/>
           </a:prstGeom>
           <a:noFill/>
-          <a:ln w="12700">
+          <a:ln w="12600">
             <a:noFill/>
           </a:ln>
         </p:spPr>
@@ -4663,7 +4463,7 @@
             <a:avLst/>
           </a:prstGeom>
           <a:noFill/>
-          <a:ln w="12700">
+          <a:ln w="12600">
             <a:noFill/>
           </a:ln>
         </p:spPr>
@@ -4720,7 +4520,7 @@
             <a:avLst/>
           </a:prstGeom>
           <a:noFill/>
-          <a:ln w="12700">
+          <a:ln w="12600">
             <a:noFill/>
           </a:ln>
         </p:spPr>
@@ -4795,7 +4595,7 @@
             <a:prstGeom prst="rect">
               <a:avLst/>
             </a:prstGeom>
-            <a:ln w="12700">
+            <a:ln w="12600">
               <a:noFill/>
             </a:ln>
           </p:spPr>
@@ -4818,7 +4618,7 @@
             <a:prstGeom prst="rect">
               <a:avLst/>
             </a:prstGeom>
-            <a:ln w="12700">
+            <a:ln w="12600">
               <a:noFill/>
             </a:ln>
           </p:spPr>
@@ -4842,7 +4642,7 @@
                 <a:alpha val="43000"/>
               </a:srgbClr>
             </a:solidFill>
-            <a:ln w="12700">
+            <a:ln w="12600">
               <a:noFill/>
             </a:ln>
           </p:spPr>
@@ -4857,14 +4657,6 @@
               <a:noAutofit/>
             </a:bodyPr>
             <a:p>
-              <a:pPr algn="ctr">
-                <a:lnSpc>
-                  <a:spcPct val="100000"/>
-                </a:lnSpc>
-                <a:tabLst>
-                  <a:tab algn="l" pos="0"/>
-                </a:tabLst>
-              </a:pPr>
               <a:endParaRPr b="0" lang="en-US" sz="3200" spc="-1" strike="noStrike">
                 <a:solidFill>
                   <a:srgbClr val="000000"/>
@@ -4894,7 +4686,7 @@
                 <a:alpha val="27000"/>
               </a:srgbClr>
             </a:solidFill>
-            <a:ln w="12700">
+            <a:ln w="12600">
               <a:noFill/>
             </a:ln>
           </p:spPr>
@@ -4909,14 +4701,6 @@
               <a:noAutofit/>
             </a:bodyPr>
             <a:p>
-              <a:pPr algn="ctr">
-                <a:lnSpc>
-                  <a:spcPct val="100000"/>
-                </a:lnSpc>
-                <a:tabLst>
-                  <a:tab algn="l" pos="0"/>
-                </a:tabLst>
-              </a:pPr>
               <a:endParaRPr b="0" lang="en-US" sz="3200" spc="-1" strike="noStrike">
                 <a:solidFill>
                   <a:srgbClr val="000000"/>
@@ -4946,7 +4730,7 @@
                 <a:alpha val="30000"/>
               </a:srgbClr>
             </a:solidFill>
-            <a:ln w="12700">
+            <a:ln w="12600">
               <a:noFill/>
             </a:ln>
           </p:spPr>
@@ -4961,14 +4745,6 @@
               <a:noAutofit/>
             </a:bodyPr>
             <a:p>
-              <a:pPr algn="ctr">
-                <a:lnSpc>
-                  <a:spcPct val="100000"/>
-                </a:lnSpc>
-                <a:tabLst>
-                  <a:tab algn="l" pos="0"/>
-                </a:tabLst>
-              </a:pPr>
               <a:endParaRPr b="0" lang="en-US" sz="3200" spc="-1" strike="noStrike">
                 <a:solidFill>
                   <a:srgbClr val="000000"/>
@@ -4998,7 +4774,7 @@
                 <a:alpha val="43000"/>
               </a:srgbClr>
             </a:solidFill>
-            <a:ln w="12700">
+            <a:ln w="12600">
               <a:noFill/>
             </a:ln>
           </p:spPr>
@@ -5013,14 +4789,6 @@
               <a:noAutofit/>
             </a:bodyPr>
             <a:p>
-              <a:pPr algn="ctr">
-                <a:lnSpc>
-                  <a:spcPct val="100000"/>
-                </a:lnSpc>
-                <a:tabLst>
-                  <a:tab algn="l" pos="0"/>
-                </a:tabLst>
-              </a:pPr>
               <a:endParaRPr b="0" lang="en-US" sz="3200" spc="-1" strike="noStrike">
                 <a:solidFill>
                   <a:srgbClr val="000000"/>
@@ -5074,7 +4842,7 @@
               <a:alpha val="28000"/>
             </a:srgbClr>
           </a:solidFill>
-          <a:ln w="12700">
+          <a:ln w="12600">
             <a:noFill/>
           </a:ln>
         </p:spPr>
@@ -5089,14 +4857,6 @@
             <a:noAutofit/>
           </a:bodyPr>
           <a:p>
-            <a:pPr algn="ctr">
-              <a:lnSpc>
-                <a:spcPct val="100000"/>
-              </a:lnSpc>
-              <a:tabLst>
-                <a:tab algn="l" pos="0"/>
-              </a:tabLst>
-            </a:pPr>
             <a:endParaRPr b="0" lang="en-US" sz="3200" spc="-1" strike="noStrike">
               <a:solidFill>
                 <a:srgbClr val="000000"/>
@@ -5142,7 +4902,7 @@
             </a:pathLst>
           </a:custGeom>
           <a:noFill/>
-          <a:ln w="50800">
+          <a:ln w="50760">
             <a:solidFill>
               <a:srgbClr val="000000"/>
             </a:solidFill>
@@ -5161,14 +4921,6 @@
             <a:noAutofit/>
           </a:bodyPr>
           <a:p>
-            <a:pPr algn="ctr">
-              <a:lnSpc>
-                <a:spcPct val="100000"/>
-              </a:lnSpc>
-              <a:tabLst>
-                <a:tab algn="l" pos="0"/>
-              </a:tabLst>
-            </a:pPr>
             <a:endParaRPr b="1" lang="en-US" sz="3000" spc="-1" strike="noStrike">
               <a:solidFill>
                 <a:srgbClr val="000000"/>
@@ -5198,7 +4950,7 @@
               <a:alpha val="28000"/>
             </a:srgbClr>
           </a:solidFill>
-          <a:ln w="12700">
+          <a:ln w="12600">
             <a:noFill/>
           </a:ln>
         </p:spPr>
@@ -5213,14 +4965,6 @@
             <a:noAutofit/>
           </a:bodyPr>
           <a:p>
-            <a:pPr algn="ctr">
-              <a:lnSpc>
-                <a:spcPct val="100000"/>
-              </a:lnSpc>
-              <a:tabLst>
-                <a:tab algn="l" pos="0"/>
-              </a:tabLst>
-            </a:pPr>
             <a:endParaRPr b="0" lang="en-US" sz="3200" spc="-1" strike="noStrike">
               <a:solidFill>
                 <a:srgbClr val="011993"/>
@@ -5250,7 +4994,7 @@
               <a:alpha val="39000"/>
             </a:srgbClr>
           </a:solidFill>
-          <a:ln w="12700">
+          <a:ln w="12600">
             <a:noFill/>
           </a:ln>
         </p:spPr>
@@ -5265,14 +5009,6 @@
             <a:noAutofit/>
           </a:bodyPr>
           <a:p>
-            <a:pPr algn="ctr">
-              <a:lnSpc>
-                <a:spcPct val="100000"/>
-              </a:lnSpc>
-              <a:tabLst>
-                <a:tab algn="l" pos="0"/>
-              </a:tabLst>
-            </a:pPr>
             <a:endParaRPr b="0" lang="en-US" sz="3200" spc="-1" strike="noStrike">
               <a:solidFill>
                 <a:srgbClr val="000000"/>
@@ -5302,7 +5038,7 @@
               <a:alpha val="39000"/>
             </a:srgbClr>
           </a:solidFill>
-          <a:ln w="12700">
+          <a:ln w="12600">
             <a:noFill/>
           </a:ln>
         </p:spPr>
@@ -5317,14 +5053,6 @@
             <a:noAutofit/>
           </a:bodyPr>
           <a:p>
-            <a:pPr algn="ctr">
-              <a:lnSpc>
-                <a:spcPct val="100000"/>
-              </a:lnSpc>
-              <a:tabLst>
-                <a:tab algn="l" pos="0"/>
-              </a:tabLst>
-            </a:pPr>
             <a:endParaRPr b="0" lang="en-US" sz="3200" spc="-1" strike="noStrike">
               <a:solidFill>
                 <a:srgbClr val="000000"/>
@@ -5354,7 +5082,7 @@
               <a:alpha val="25000"/>
             </a:srgbClr>
           </a:solidFill>
-          <a:ln w="12700">
+          <a:ln w="12600">
             <a:noFill/>
           </a:ln>
         </p:spPr>
@@ -5369,14 +5097,6 @@
             <a:noAutofit/>
           </a:bodyPr>
           <a:p>
-            <a:pPr algn="ctr">
-              <a:lnSpc>
-                <a:spcPct val="100000"/>
-              </a:lnSpc>
-              <a:tabLst>
-                <a:tab algn="l" pos="0"/>
-              </a:tabLst>
-            </a:pPr>
             <a:endParaRPr b="0" lang="en-US" sz="3200" spc="-1" strike="noStrike">
               <a:solidFill>
                 <a:srgbClr val="000000"/>
@@ -5422,7 +5142,7 @@
             </a:pathLst>
           </a:custGeom>
           <a:noFill/>
-          <a:ln w="50800">
+          <a:ln w="50760">
             <a:solidFill>
               <a:srgbClr val="000000"/>
             </a:solidFill>
@@ -5441,14 +5161,6 @@
             <a:noAutofit/>
           </a:bodyPr>
           <a:p>
-            <a:pPr algn="ctr">
-              <a:lnSpc>
-                <a:spcPct val="100000"/>
-              </a:lnSpc>
-              <a:tabLst>
-                <a:tab algn="l" pos="0"/>
-              </a:tabLst>
-            </a:pPr>
             <a:endParaRPr b="1" lang="en-US" sz="3000" spc="-1" strike="noStrike">
               <a:solidFill>
                 <a:srgbClr val="000000"/>
@@ -5477,7 +5189,7 @@
           <a:prstGeom prst="rect">
             <a:avLst/>
           </a:prstGeom>
-          <a:ln w="12700">
+          <a:ln w="12600">
             <a:noFill/>
           </a:ln>
         </p:spPr>
@@ -5517,7 +5229,7 @@
             </a:pathLst>
           </a:custGeom>
           <a:noFill/>
-          <a:ln w="50800">
+          <a:ln w="50760">
             <a:solidFill>
               <a:srgbClr val="000000"/>
             </a:solidFill>
@@ -5536,14 +5248,6 @@
             <a:noAutofit/>
           </a:bodyPr>
           <a:p>
-            <a:pPr algn="ctr">
-              <a:lnSpc>
-                <a:spcPct val="100000"/>
-              </a:lnSpc>
-              <a:tabLst>
-                <a:tab algn="l" pos="0"/>
-              </a:tabLst>
-            </a:pPr>
             <a:endParaRPr b="1" lang="en-US" sz="3000" spc="-1" strike="noStrike">
               <a:solidFill>
                 <a:srgbClr val="000000"/>
@@ -5589,7 +5293,7 @@
             </a:pathLst>
           </a:custGeom>
           <a:noFill/>
-          <a:ln w="50800">
+          <a:ln w="50760">
             <a:solidFill>
               <a:srgbClr val="000000"/>
             </a:solidFill>
@@ -5608,11 +5312,6 @@
             <a:noAutofit/>
           </a:bodyPr>
           <a:p>
-            <a:pPr>
-              <a:lnSpc>
-                <a:spcPct val="100000"/>
-              </a:lnSpc>
-            </a:pPr>
             <a:endParaRPr b="1" lang="en-US" sz="3000" spc="-1" strike="noStrike">
               <a:solidFill>
                 <a:srgbClr val="000000"/>
@@ -5658,7 +5357,7 @@
             </a:pathLst>
           </a:custGeom>
           <a:noFill/>
-          <a:ln w="50800">
+          <a:ln w="50760">
             <a:solidFill>
               <a:srgbClr val="000000"/>
             </a:solidFill>
@@ -5677,11 +5376,6 @@
             <a:noAutofit/>
           </a:bodyPr>
           <a:p>
-            <a:pPr>
-              <a:lnSpc>
-                <a:spcPct val="100000"/>
-              </a:lnSpc>
-            </a:pPr>
             <a:endParaRPr b="1" lang="en-US" sz="3000" spc="-1" strike="noStrike">
               <a:solidFill>
                 <a:srgbClr val="000000"/>
@@ -5700,7 +5394,7 @@
         </p:nvSpPr>
         <p:spPr>
           <a:xfrm flipH="1">
-            <a:off x="17601840" y="3886200"/>
+            <a:off x="17601120" y="3886200"/>
             <a:ext cx="228600" cy="643680"/>
           </a:xfrm>
           <a:custGeom>
@@ -5727,7 +5421,7 @@
             </a:pathLst>
           </a:custGeom>
           <a:noFill/>
-          <a:ln w="50800">
+          <a:ln w="50760">
             <a:solidFill>
               <a:srgbClr val="000000"/>
             </a:solidFill>
@@ -5746,11 +5440,6 @@
             <a:noAutofit/>
           </a:bodyPr>
           <a:p>
-            <a:pPr>
-              <a:lnSpc>
-                <a:spcPct val="100000"/>
-              </a:lnSpc>
-            </a:pPr>
             <a:endParaRPr b="1" lang="en-US" sz="3000" spc="-1" strike="noStrike">
               <a:solidFill>
                 <a:srgbClr val="000000"/>
@@ -5780,7 +5469,7 @@
               <a:alpha val="28000"/>
             </a:srgbClr>
           </a:solidFill>
-          <a:ln w="12700">
+          <a:ln w="12600">
             <a:noFill/>
           </a:ln>
         </p:spPr>
@@ -5795,11 +5484,6 @@
             <a:noAutofit/>
           </a:bodyPr>
           <a:p>
-            <a:pPr>
-              <a:lnSpc>
-                <a:spcPct val="100000"/>
-              </a:lnSpc>
-            </a:pPr>
             <a:endParaRPr b="0" lang="en-US" sz="3200" spc="-1" strike="noStrike">
               <a:solidFill>
                 <a:srgbClr val="011993"/>
@@ -5845,7 +5529,7 @@
             </a:pathLst>
           </a:custGeom>
           <a:noFill/>
-          <a:ln w="50800">
+          <a:ln w="50760">
             <a:solidFill>
               <a:srgbClr val="000000"/>
             </a:solidFill>
@@ -5893,7 +5577,7 @@
               <a:alpha val="28000"/>
             </a:srgbClr>
           </a:solidFill>
-          <a:ln w="12700">
+          <a:ln w="12600">
             <a:noFill/>
           </a:ln>
         </p:spPr>
@@ -5937,7 +5621,7 @@
               <a:alpha val="28000"/>
             </a:srgbClr>
           </a:solidFill>
-          <a:ln w="12700">
+          <a:ln w="12600">
             <a:noFill/>
           </a:ln>
         </p:spPr>
@@ -5985,32 +5669,9 @@
           </a:ln>
         </p:spPr>
       </p:pic>
-      <p:pic>
-        <p:nvPicPr>
-          <p:cNvPr id="106" name="" descr=""/>
-          <p:cNvPicPr/>
-          <p:nvPr/>
-        </p:nvPicPr>
-        <p:blipFill>
-          <a:blip r:embed="rId6"/>
-          <a:stretch/>
-        </p:blipFill>
-        <p:spPr>
-          <a:xfrm>
-            <a:off x="17950680" y="974880"/>
-            <a:ext cx="3429000" cy="1311120"/>
-          </a:xfrm>
-          <a:prstGeom prst="rect">
-            <a:avLst/>
-          </a:prstGeom>
-          <a:ln w="0">
-            <a:noFill/>
-          </a:ln>
-        </p:spPr>
-      </p:pic>
-      <p:sp>
-        <p:nvSpPr>
-          <p:cNvPr id="107" name="Rectangle 4"/>
+      <p:sp>
+        <p:nvSpPr>
+          <p:cNvPr id="106" name="Rectangle 4"/>
           <p:cNvSpPr/>
           <p:nvPr/>
         </p:nvSpPr>
@@ -6027,7 +5688,7 @@
               <a:alpha val="28000"/>
             </a:srgbClr>
           </a:solidFill>
-          <a:ln w="12700">
+          <a:ln w="12600">
             <a:noFill/>
           </a:ln>
         </p:spPr>
@@ -6054,6 +5715,29 @@
       </p:sp>
       <p:pic>
         <p:nvPicPr>
+          <p:cNvPr id="107" name="" descr=""/>
+          <p:cNvPicPr/>
+          <p:nvPr/>
+        </p:nvPicPr>
+        <p:blipFill>
+          <a:blip r:embed="rId6"/>
+          <a:stretch/>
+        </p:blipFill>
+        <p:spPr>
+          <a:xfrm>
+            <a:off x="5749200" y="-781200"/>
+            <a:ext cx="9898200" cy="3763080"/>
+          </a:xfrm>
+          <a:prstGeom prst="rect">
+            <a:avLst/>
+          </a:prstGeom>
+          <a:ln w="0">
+            <a:noFill/>
+          </a:ln>
+        </p:spPr>
+      </p:pic>
+      <p:pic>
+        <p:nvPicPr>
           <p:cNvPr id="108" name="" descr=""/>
           <p:cNvPicPr/>
           <p:nvPr/>
@@ -6064,8 +5748,8 @@
         </p:blipFill>
         <p:spPr>
           <a:xfrm>
-            <a:off x="5749200" y="-781200"/>
-            <a:ext cx="9898200" cy="3763080"/>
+            <a:off x="-138960" y="4182480"/>
+            <a:ext cx="11662920" cy="3438720"/>
           </a:xfrm>
           <a:prstGeom prst="rect">
             <a:avLst/>
@@ -6087,29 +5771,6 @@
         </p:blipFill>
         <p:spPr>
           <a:xfrm>
-            <a:off x="-138960" y="4182480"/>
-            <a:ext cx="11662920" cy="3438720"/>
-          </a:xfrm>
-          <a:prstGeom prst="rect">
-            <a:avLst/>
-          </a:prstGeom>
-          <a:ln w="0">
-            <a:noFill/>
-          </a:ln>
-        </p:spPr>
-      </p:pic>
-      <p:pic>
-        <p:nvPicPr>
-          <p:cNvPr id="110" name="" descr=""/>
-          <p:cNvPicPr/>
-          <p:nvPr/>
-        </p:nvPicPr>
-        <p:blipFill>
-          <a:blip r:embed="rId9"/>
-          <a:stretch/>
-        </p:blipFill>
-        <p:spPr>
-          <a:xfrm>
             <a:off x="4469400" y="1406160"/>
             <a:ext cx="15544800" cy="3271680"/>
           </a:xfrm>
@@ -6123,7 +5784,7 @@
       </p:pic>
       <p:sp>
         <p:nvSpPr>
-          <p:cNvPr id="111" name="Rectangle 5"/>
+          <p:cNvPr id="110" name="Rectangle 5"/>
           <p:cNvSpPr/>
           <p:nvPr/>
         </p:nvSpPr>
@@ -6140,7 +5801,7 @@
               <a:alpha val="28000"/>
             </a:srgbClr>
           </a:solidFill>
-          <a:ln w="12700">
+          <a:ln w="12600">
             <a:noFill/>
           </a:ln>
         </p:spPr>
@@ -6167,6 +5828,29 @@
       </p:sp>
       <p:pic>
         <p:nvPicPr>
+          <p:cNvPr id="111" name="" descr=""/>
+          <p:cNvPicPr/>
+          <p:nvPr/>
+        </p:nvPicPr>
+        <p:blipFill>
+          <a:blip r:embed="rId9"/>
+          <a:stretch/>
+        </p:blipFill>
+        <p:spPr>
+          <a:xfrm>
+            <a:off x="18228600" y="2311200"/>
+            <a:ext cx="4932720" cy="1600200"/>
+          </a:xfrm>
+          <a:prstGeom prst="rect">
+            <a:avLst/>
+          </a:prstGeom>
+          <a:ln w="0">
+            <a:noFill/>
+          </a:ln>
+        </p:spPr>
+      </p:pic>
+      <p:pic>
+        <p:nvPicPr>
           <p:cNvPr id="112" name="" descr=""/>
           <p:cNvPicPr/>
           <p:nvPr/>
@@ -6177,8 +5861,8 @@
         </p:blipFill>
         <p:spPr>
           <a:xfrm>
-            <a:off x="18228600" y="2311200"/>
-            <a:ext cx="4932720" cy="1600200"/>
+            <a:off x="18399600" y="3357000"/>
+            <a:ext cx="2832840" cy="1600200"/>
           </a:xfrm>
           <a:prstGeom prst="rect">
             <a:avLst/>
@@ -6200,8 +5884,8 @@
         </p:blipFill>
         <p:spPr>
           <a:xfrm>
-            <a:off x="18399600" y="3357000"/>
-            <a:ext cx="2832840" cy="1600200"/>
+            <a:off x="13270320" y="6955200"/>
+            <a:ext cx="12693240" cy="2217600"/>
           </a:xfrm>
           <a:prstGeom prst="rect">
             <a:avLst/>
@@ -6223,8 +5907,8 @@
         </p:blipFill>
         <p:spPr>
           <a:xfrm>
-            <a:off x="13270320" y="6955200"/>
-            <a:ext cx="12693240" cy="2217600"/>
+            <a:off x="4988160" y="10996200"/>
+            <a:ext cx="10177200" cy="1608840"/>
           </a:xfrm>
           <a:prstGeom prst="rect">
             <a:avLst/>
@@ -6246,8 +5930,8 @@
         </p:blipFill>
         <p:spPr>
           <a:xfrm>
-            <a:off x="4988160" y="10996200"/>
-            <a:ext cx="10177200" cy="1608840"/>
+            <a:off x="544320" y="7700400"/>
+            <a:ext cx="9913320" cy="2127600"/>
           </a:xfrm>
           <a:prstGeom prst="rect">
             <a:avLst/>
@@ -6269,8 +5953,8 @@
         </p:blipFill>
         <p:spPr>
           <a:xfrm>
-            <a:off x="544320" y="7700400"/>
-            <a:ext cx="9913320" cy="2127600"/>
+            <a:off x="17198640" y="4491000"/>
+            <a:ext cx="9510840" cy="2041200"/>
           </a:xfrm>
           <a:prstGeom prst="rect">
             <a:avLst/>
@@ -6292,8 +5976,8 @@
         </p:blipFill>
         <p:spPr>
           <a:xfrm>
-            <a:off x="17198640" y="4491000"/>
-            <a:ext cx="9510840" cy="2041200"/>
+            <a:off x="14772240" y="5344560"/>
+            <a:ext cx="10409760" cy="2234160"/>
           </a:xfrm>
           <a:prstGeom prst="rect">
             <a:avLst/>
@@ -6315,29 +5999,6 @@
         </p:blipFill>
         <p:spPr>
           <a:xfrm>
-            <a:off x="14772240" y="5344560"/>
-            <a:ext cx="10409760" cy="2234160"/>
-          </a:xfrm>
-          <a:prstGeom prst="rect">
-            <a:avLst/>
-          </a:prstGeom>
-          <a:ln w="0">
-            <a:noFill/>
-          </a:ln>
-        </p:spPr>
-      </p:pic>
-      <p:pic>
-        <p:nvPicPr>
-          <p:cNvPr id="119" name="" descr=""/>
-          <p:cNvPicPr/>
-          <p:nvPr/>
-        </p:nvPicPr>
-        <p:blipFill>
-          <a:blip r:embed="rId17"/>
-          <a:stretch/>
-        </p:blipFill>
-        <p:spPr>
-          <a:xfrm>
             <a:off x="10143000" y="7478280"/>
             <a:ext cx="3103200" cy="2765520"/>
           </a:xfrm>
@@ -6351,7 +6012,7 @@
       </p:pic>
       <p:sp>
         <p:nvSpPr>
-          <p:cNvPr id="120" name="Connection Line 5"/>
+          <p:cNvPr id="119" name="Connection Line 5"/>
           <p:cNvSpPr/>
           <p:nvPr/>
         </p:nvSpPr>
@@ -6384,7 +6045,7 @@
             </a:pathLst>
           </a:custGeom>
           <a:noFill/>
-          <a:ln w="50800">
+          <a:ln w="50760">
             <a:solidFill>
               <a:srgbClr val="000000"/>
             </a:solidFill>
@@ -6415,7 +6076,7 @@
       </p:sp>
       <p:sp>
         <p:nvSpPr>
-          <p:cNvPr id="121" name="Rectangle 6"/>
+          <p:cNvPr id="120" name="Rectangle 6"/>
           <p:cNvSpPr/>
           <p:nvPr/>
         </p:nvSpPr>
@@ -6432,7 +6093,7 @@
               <a:alpha val="28000"/>
             </a:srgbClr>
           </a:solidFill>
-          <a:ln w="12700">
+          <a:ln w="12600">
             <a:noFill/>
           </a:ln>
         </p:spPr>
@@ -6459,7 +6120,7 @@
       </p:sp>
       <p:sp>
         <p:nvSpPr>
-          <p:cNvPr id="122" name="Rectangle 7"/>
+          <p:cNvPr id="121" name="Rectangle 7"/>
           <p:cNvSpPr/>
           <p:nvPr/>
         </p:nvSpPr>
@@ -6476,7 +6137,7 @@
               <a:alpha val="28000"/>
             </a:srgbClr>
           </a:solidFill>
-          <a:ln w="12700">
+          <a:ln w="12600">
             <a:noFill/>
           </a:ln>
         </p:spPr>
@@ -6501,6 +6162,29 @@
           </a:p>
         </p:txBody>
       </p:sp>
+      <p:pic>
+        <p:nvPicPr>
+          <p:cNvPr id="122" name="" descr=""/>
+          <p:cNvPicPr/>
+          <p:nvPr/>
+        </p:nvPicPr>
+        <p:blipFill>
+          <a:blip r:embed="rId17"/>
+          <a:stretch/>
+        </p:blipFill>
+        <p:spPr>
+          <a:xfrm>
+            <a:off x="17843040" y="915120"/>
+            <a:ext cx="4030560" cy="1426320"/>
+          </a:xfrm>
+          <a:prstGeom prst="rect">
+            <a:avLst/>
+          </a:prstGeom>
+          <a:ln w="0">
+            <a:noFill/>
+          </a:ln>
+        </p:spPr>
+      </p:pic>
     </p:spTree>
   </p:cSld>
   <mc:AlternateContent>

</xml_diff>